<commit_message>
Refactor events that has 'Module' in it
</commit_message>
<xml_diff>
--- a/docs/diagrams/AddSequenceDiagram.pptx
+++ b/docs/diagrams/AddSequenceDiagram.pptx
@@ -261,7 +261,7 @@
           <a:p>
             <a:fld id="{8232046C-6D40-452F-81F1-1752E4C74DCD}" type="datetimeFigureOut">
               <a:rPr lang="en-SG" smtClean="0"/>
-              <a:t>11/11/2018</a:t>
+              <a:t>12/11/2018</a:t>
             </a:fld>
             <a:endParaRPr lang="en-SG"/>
           </a:p>
@@ -461,7 +461,7 @@
           <a:p>
             <a:fld id="{8232046C-6D40-452F-81F1-1752E4C74DCD}" type="datetimeFigureOut">
               <a:rPr lang="en-SG" smtClean="0"/>
-              <a:t>11/11/2018</a:t>
+              <a:t>12/11/2018</a:t>
             </a:fld>
             <a:endParaRPr lang="en-SG"/>
           </a:p>
@@ -671,7 +671,7 @@
           <a:p>
             <a:fld id="{8232046C-6D40-452F-81F1-1752E4C74DCD}" type="datetimeFigureOut">
               <a:rPr lang="en-SG" smtClean="0"/>
-              <a:t>11/11/2018</a:t>
+              <a:t>12/11/2018</a:t>
             </a:fld>
             <a:endParaRPr lang="en-SG"/>
           </a:p>
@@ -871,7 +871,7 @@
           <a:p>
             <a:fld id="{8232046C-6D40-452F-81F1-1752E4C74DCD}" type="datetimeFigureOut">
               <a:rPr lang="en-SG" smtClean="0"/>
-              <a:t>11/11/2018</a:t>
+              <a:t>12/11/2018</a:t>
             </a:fld>
             <a:endParaRPr lang="en-SG"/>
           </a:p>
@@ -1147,7 +1147,7 @@
           <a:p>
             <a:fld id="{8232046C-6D40-452F-81F1-1752E4C74DCD}" type="datetimeFigureOut">
               <a:rPr lang="en-SG" smtClean="0"/>
-              <a:t>11/11/2018</a:t>
+              <a:t>12/11/2018</a:t>
             </a:fld>
             <a:endParaRPr lang="en-SG"/>
           </a:p>
@@ -1415,7 +1415,7 @@
           <a:p>
             <a:fld id="{8232046C-6D40-452F-81F1-1752E4C74DCD}" type="datetimeFigureOut">
               <a:rPr lang="en-SG" smtClean="0"/>
-              <a:t>11/11/2018</a:t>
+              <a:t>12/11/2018</a:t>
             </a:fld>
             <a:endParaRPr lang="en-SG"/>
           </a:p>
@@ -1830,7 +1830,7 @@
           <a:p>
             <a:fld id="{8232046C-6D40-452F-81F1-1752E4C74DCD}" type="datetimeFigureOut">
               <a:rPr lang="en-SG" smtClean="0"/>
-              <a:t>11/11/2018</a:t>
+              <a:t>12/11/2018</a:t>
             </a:fld>
             <a:endParaRPr lang="en-SG"/>
           </a:p>
@@ -1972,7 +1972,7 @@
           <a:p>
             <a:fld id="{8232046C-6D40-452F-81F1-1752E4C74DCD}" type="datetimeFigureOut">
               <a:rPr lang="en-SG" smtClean="0"/>
-              <a:t>11/11/2018</a:t>
+              <a:t>12/11/2018</a:t>
             </a:fld>
             <a:endParaRPr lang="en-SG"/>
           </a:p>
@@ -2085,7 +2085,7 @@
           <a:p>
             <a:fld id="{8232046C-6D40-452F-81F1-1752E4C74DCD}" type="datetimeFigureOut">
               <a:rPr lang="en-SG" smtClean="0"/>
-              <a:t>11/11/2018</a:t>
+              <a:t>12/11/2018</a:t>
             </a:fld>
             <a:endParaRPr lang="en-SG"/>
           </a:p>
@@ -2398,7 +2398,7 @@
           <a:p>
             <a:fld id="{8232046C-6D40-452F-81F1-1752E4C74DCD}" type="datetimeFigureOut">
               <a:rPr lang="en-SG" smtClean="0"/>
-              <a:t>11/11/2018</a:t>
+              <a:t>12/11/2018</a:t>
             </a:fld>
             <a:endParaRPr lang="en-SG"/>
           </a:p>
@@ -2687,7 +2687,7 @@
           <a:p>
             <a:fld id="{8232046C-6D40-452F-81F1-1752E4C74DCD}" type="datetimeFigureOut">
               <a:rPr lang="en-SG" smtClean="0"/>
-              <a:t>11/11/2018</a:t>
+              <a:t>12/11/2018</a:t>
             </a:fld>
             <a:endParaRPr lang="en-SG"/>
           </a:p>
@@ -2930,7 +2930,7 @@
           <a:p>
             <a:fld id="{8232046C-6D40-452F-81F1-1752E4C74DCD}" type="datetimeFigureOut">
               <a:rPr lang="en-SG" smtClean="0"/>
-              <a:t>11/11/2018</a:t>
+              <a:t>12/11/2018</a:t>
             </a:fld>
             <a:endParaRPr lang="en-SG"/>
           </a:p>
@@ -6518,7 +6518,7 @@
         </p:nvSpPr>
         <p:spPr>
           <a:xfrm>
-            <a:off x="2843948" y="4660137"/>
+            <a:off x="2869155" y="4660424"/>
             <a:ext cx="1814121" cy="184666"/>
           </a:xfrm>
           <a:prstGeom prst="rect">
@@ -7290,6 +7290,51 @@
           <a:xfrm flipH="1">
             <a:off x="-1616635" y="1918129"/>
             <a:ext cx="7053" cy="4415553"/>
+          </a:xfrm>
+          <a:prstGeom prst="line">
+            <a:avLst/>
+          </a:prstGeom>
+          <a:ln w="19050">
+            <a:solidFill>
+              <a:srgbClr val="0070C0"/>
+            </a:solidFill>
+            <a:prstDash val="sysDash"/>
+          </a:ln>
+          <a:effectLst/>
+        </p:spPr>
+        <p:style>
+          <a:lnRef idx="1">
+            <a:schemeClr val="accent1"/>
+          </a:lnRef>
+          <a:fillRef idx="2">
+            <a:schemeClr val="accent1"/>
+          </a:fillRef>
+          <a:effectRef idx="1">
+            <a:schemeClr val="accent1"/>
+          </a:effectRef>
+          <a:fontRef idx="minor">
+            <a:schemeClr val="dk1"/>
+          </a:fontRef>
+        </p:style>
+      </p:cxnSp>
+      <p:cxnSp>
+        <p:nvCxnSpPr>
+          <p:cNvPr id="72" name="Straight Connector 71">
+            <a:extLst>
+              <a:ext uri="{FF2B5EF4-FFF2-40B4-BE49-F238E27FC236}">
+                <a16:creationId xmlns:a16="http://schemas.microsoft.com/office/drawing/2014/main" id="{D7395F84-B1EB-47D3-9BCA-C74DFE2B78AD}"/>
+              </a:ext>
+            </a:extLst>
+          </p:cNvPr>
+          <p:cNvCxnSpPr>
+            <a:cxnSpLocks/>
+          </p:cNvCxnSpPr>
+          <p:nvPr/>
+        </p:nvCxnSpPr>
+        <p:spPr>
+          <a:xfrm flipH="1">
+            <a:off x="3145749" y="3731801"/>
+            <a:ext cx="11140" cy="1733460"/>
           </a:xfrm>
           <a:prstGeom prst="line">
             <a:avLst/>

</xml_diff>

<commit_message>
Update add and status sequence diagram
</commit_message>
<xml_diff>
--- a/docs/diagrams/AddSequenceDiagram.pptx
+++ b/docs/diagrams/AddSequenceDiagram.pptx
@@ -3349,10 +3349,10 @@
       </p:grpSpPr>
       <p:sp>
         <p:nvSpPr>
-          <p:cNvPr id="114" name="Rectangle 65">
-            <a:extLst>
-              <a:ext uri="{FF2B5EF4-FFF2-40B4-BE49-F238E27FC236}">
-                <a16:creationId xmlns:a16="http://schemas.microsoft.com/office/drawing/2014/main" id="{5D9EEFAD-31A9-4B4B-BF87-CAA4CAF0BA0F}"/>
+          <p:cNvPr id="115" name="Rectangle 65">
+            <a:extLst>
+              <a:ext uri="{FF2B5EF4-FFF2-40B4-BE49-F238E27FC236}">
+                <a16:creationId xmlns:a16="http://schemas.microsoft.com/office/drawing/2014/main" id="{20DF95B5-A09C-44EC-BBFD-D35AEF5587DB}"/>
               </a:ext>
             </a:extLst>
           </p:cNvPr>
@@ -3361,75 +3361,8 @@
         </p:nvSpPr>
         <p:spPr>
           <a:xfrm>
-            <a:off x="9112329" y="1258100"/>
-            <a:ext cx="2011484" cy="4873688"/>
-          </a:xfrm>
-          <a:prstGeom prst="roundRect">
-            <a:avLst>
-              <a:gd name="adj" fmla="val 3484"/>
-            </a:avLst>
-          </a:prstGeom>
-          <a:solidFill>
-            <a:schemeClr val="accent2">
-              <a:lumMod val="20000"/>
-              <a:lumOff val="80000"/>
-            </a:schemeClr>
-          </a:solidFill>
-          <a:ln w="19050">
-            <a:noFill/>
-          </a:ln>
-          <a:effectLst/>
-        </p:spPr>
-        <p:style>
-          <a:lnRef idx="1">
-            <a:schemeClr val="accent2"/>
-          </a:lnRef>
-          <a:fillRef idx="2">
-            <a:schemeClr val="accent2"/>
-          </a:fillRef>
-          <a:effectRef idx="1">
-            <a:schemeClr val="accent2"/>
-          </a:effectRef>
-          <a:fontRef idx="minor">
-            <a:schemeClr val="dk1"/>
-          </a:fontRef>
-        </p:style>
-        <p:txBody>
-          <a:bodyPr rtlCol="0" anchor="t"/>
-          <a:lstStyle/>
-          <a:p>
-            <a:r>
-              <a:rPr lang="en-US" sz="1200" b="1" dirty="0">
-                <a:solidFill>
-                  <a:schemeClr val="accent2"/>
-                </a:solidFill>
-              </a:rPr>
-              <a:t>Common</a:t>
-            </a:r>
-            <a:endParaRPr lang="en-SG" sz="1200" b="1" dirty="0">
-              <a:solidFill>
-                <a:schemeClr val="accent2"/>
-              </a:solidFill>
-            </a:endParaRPr>
-          </a:p>
-        </p:txBody>
-      </p:sp>
-      <p:sp>
-        <p:nvSpPr>
-          <p:cNvPr id="115" name="Rectangle 65">
-            <a:extLst>
-              <a:ext uri="{FF2B5EF4-FFF2-40B4-BE49-F238E27FC236}">
-                <a16:creationId xmlns:a16="http://schemas.microsoft.com/office/drawing/2014/main" id="{20DF95B5-A09C-44EC-BBFD-D35AEF5587DB}"/>
-              </a:ext>
-            </a:extLst>
-          </p:cNvPr>
-          <p:cNvSpPr/>
-          <p:nvPr/>
-        </p:nvSpPr>
-        <p:spPr>
-          <a:xfrm>
-            <a:off x="-3120043" y="1280158"/>
-            <a:ext cx="6683541" cy="4873689"/>
+            <a:off x="1634837" y="854995"/>
+            <a:ext cx="6683541" cy="5860234"/>
           </a:xfrm>
           <a:prstGeom prst="roundRect">
             <a:avLst>
@@ -3483,10 +3416,10 @@
       </p:sp>
       <p:sp>
         <p:nvSpPr>
-          <p:cNvPr id="113" name="Rectangle 65">
-            <a:extLst>
-              <a:ext uri="{FF2B5EF4-FFF2-40B4-BE49-F238E27FC236}">
-                <a16:creationId xmlns:a16="http://schemas.microsoft.com/office/drawing/2014/main" id="{2EB347B2-2179-46FD-A6B4-343CAF673484}"/>
+          <p:cNvPr id="116" name="Rectangle 62">
+            <a:extLst>
+              <a:ext uri="{FF2B5EF4-FFF2-40B4-BE49-F238E27FC236}">
+                <a16:creationId xmlns:a16="http://schemas.microsoft.com/office/drawing/2014/main" id="{C4019557-8F13-4FDE-B4DE-5C6A10D19859}"/>
               </a:ext>
             </a:extLst>
           </p:cNvPr>
@@ -3495,22 +3428,19 @@
         </p:nvSpPr>
         <p:spPr>
           <a:xfrm>
-            <a:off x="11311324" y="1280160"/>
-            <a:ext cx="2011484" cy="4873688"/>
-          </a:xfrm>
-          <a:prstGeom prst="roundRect">
-            <a:avLst>
-              <a:gd name="adj" fmla="val 3484"/>
-            </a:avLst>
+            <a:off x="2434469" y="1196827"/>
+            <a:ext cx="1416980" cy="342760"/>
+          </a:xfrm>
+          <a:prstGeom prst="rect">
+            <a:avLst/>
           </a:prstGeom>
           <a:solidFill>
-            <a:schemeClr val="accent6">
-              <a:lumMod val="20000"/>
-              <a:lumOff val="80000"/>
-            </a:schemeClr>
+            <a:srgbClr val="0070C0"/>
           </a:solidFill>
           <a:ln w="19050">
-            <a:noFill/>
+            <a:solidFill>
+              <a:srgbClr val="0070C0"/>
+            </a:solidFill>
           </a:ln>
           <a:effectLst/>
         </p:spPr>
@@ -3529,20 +3459,29 @@
           </a:fontRef>
         </p:style>
         <p:txBody>
-          <a:bodyPr rtlCol="0" anchor="t"/>
+          <a:bodyPr rtlCol="0" anchor="ctr"/>
           <a:lstStyle/>
           <a:p>
-            <a:r>
-              <a:rPr lang="en-US" sz="1200" b="1" dirty="0">
-                <a:solidFill>
-                  <a:schemeClr val="accent6"/>
+            <a:pPr algn="ctr"/>
+            <a:r>
+              <a:rPr lang="en-US" sz="1600" dirty="0">
+                <a:solidFill>
+                  <a:schemeClr val="bg1"/>
                 </a:solidFill>
               </a:rPr>
-              <a:t>UI</a:t>
-            </a:r>
-            <a:endParaRPr lang="en-SG" sz="1200" b="1" dirty="0">
+              <a:t>:</a:t>
+            </a:r>
+            <a:r>
+              <a:rPr lang="en-US" sz="1600" dirty="0" err="1">
+                <a:solidFill>
+                  <a:schemeClr val="bg1"/>
+                </a:solidFill>
+              </a:rPr>
+              <a:t>LogicManager</a:t>
+            </a:r>
+            <a:endParaRPr lang="en-SG" sz="1600" dirty="0">
               <a:solidFill>
-                <a:schemeClr val="accent6"/>
+                <a:schemeClr val="bg1"/>
               </a:solidFill>
             </a:endParaRPr>
           </a:p>
@@ -3550,10 +3489,10 @@
       </p:sp>
       <p:sp>
         <p:nvSpPr>
-          <p:cNvPr id="116" name="Rectangle 62">
-            <a:extLst>
-              <a:ext uri="{FF2B5EF4-FFF2-40B4-BE49-F238E27FC236}">
-                <a16:creationId xmlns:a16="http://schemas.microsoft.com/office/drawing/2014/main" id="{C4019557-8F13-4FDE-B4DE-5C6A10D19859}"/>
+          <p:cNvPr id="117" name="Rectangle 116">
+            <a:extLst>
+              <a:ext uri="{FF2B5EF4-FFF2-40B4-BE49-F238E27FC236}">
+                <a16:creationId xmlns:a16="http://schemas.microsoft.com/office/drawing/2014/main" id="{D255A657-CE0B-485F-A9B3-45C3BD65B969}"/>
               </a:ext>
             </a:extLst>
           </p:cNvPr>
@@ -3562,8 +3501,61 @@
         </p:nvSpPr>
         <p:spPr>
           <a:xfrm>
-            <a:off x="-2320411" y="1621990"/>
-            <a:ext cx="1416980" cy="342760"/>
+            <a:off x="3090275" y="1986079"/>
+            <a:ext cx="128301" cy="3677018"/>
+          </a:xfrm>
+          <a:prstGeom prst="rect">
+            <a:avLst/>
+          </a:prstGeom>
+          <a:solidFill>
+            <a:srgbClr val="0070C0"/>
+          </a:solidFill>
+          <a:ln>
+            <a:solidFill>
+              <a:srgbClr val="0070C0"/>
+            </a:solidFill>
+          </a:ln>
+          <a:effectLst/>
+        </p:spPr>
+        <p:style>
+          <a:lnRef idx="1">
+            <a:schemeClr val="accent3"/>
+          </a:lnRef>
+          <a:fillRef idx="2">
+            <a:schemeClr val="accent3"/>
+          </a:fillRef>
+          <a:effectRef idx="1">
+            <a:schemeClr val="accent3"/>
+          </a:effectRef>
+          <a:fontRef idx="minor">
+            <a:schemeClr val="dk1"/>
+          </a:fontRef>
+        </p:style>
+        <p:txBody>
+          <a:bodyPr rtlCol="0" anchor="ctr"/>
+          <a:lstStyle/>
+          <a:p>
+            <a:pPr algn="ctr"/>
+            <a:endParaRPr lang="en-SG" sz="1400"/>
+          </a:p>
+        </p:txBody>
+      </p:sp>
+      <p:sp>
+        <p:nvSpPr>
+          <p:cNvPr id="118" name="Rectangle 62">
+            <a:extLst>
+              <a:ext uri="{FF2B5EF4-FFF2-40B4-BE49-F238E27FC236}">
+                <a16:creationId xmlns:a16="http://schemas.microsoft.com/office/drawing/2014/main" id="{00F4CA53-45E9-43BC-81ED-0C774C71F934}"/>
+              </a:ext>
+            </a:extLst>
+          </p:cNvPr>
+          <p:cNvSpPr/>
+          <p:nvPr/>
+        </p:nvSpPr>
+        <p:spPr>
+          <a:xfrm>
+            <a:off x="4505296" y="1031395"/>
+            <a:ext cx="1578129" cy="462289"/>
           </a:xfrm>
           <a:prstGeom prst="rect">
             <a:avLst/>
@@ -3611,7 +3603,23 @@
                   <a:schemeClr val="bg1"/>
                 </a:solidFill>
               </a:rPr>
-              <a:t>LogicManager</a:t>
+              <a:t>ModulePlanner</a:t>
+            </a:r>
+            <a:endParaRPr lang="en-US" sz="1600" dirty="0">
+              <a:solidFill>
+                <a:schemeClr val="bg1"/>
+              </a:solidFill>
+            </a:endParaRPr>
+          </a:p>
+          <a:p>
+            <a:pPr algn="ctr"/>
+            <a:r>
+              <a:rPr lang="en-US" sz="1600" dirty="0">
+                <a:solidFill>
+                  <a:schemeClr val="bg1"/>
+                </a:solidFill>
+              </a:rPr>
+              <a:t>Parser</a:t>
             </a:r>
             <a:endParaRPr lang="en-SG" sz="1600" dirty="0">
               <a:solidFill>
@@ -3621,12 +3629,57 @@
           </a:p>
         </p:txBody>
       </p:sp>
-      <p:sp>
-        <p:nvSpPr>
-          <p:cNvPr id="117" name="Rectangle 116">
-            <a:extLst>
-              <a:ext uri="{FF2B5EF4-FFF2-40B4-BE49-F238E27FC236}">
-                <a16:creationId xmlns:a16="http://schemas.microsoft.com/office/drawing/2014/main" id="{D255A657-CE0B-485F-A9B3-45C3BD65B969}"/>
+      <p:cxnSp>
+        <p:nvCxnSpPr>
+          <p:cNvPr id="119" name="Straight Connector 118">
+            <a:extLst>
+              <a:ext uri="{FF2B5EF4-FFF2-40B4-BE49-F238E27FC236}">
+                <a16:creationId xmlns:a16="http://schemas.microsoft.com/office/drawing/2014/main" id="{DB16570C-D1E2-4876-87B8-6A5754785BB8}"/>
+              </a:ext>
+            </a:extLst>
+          </p:cNvPr>
+          <p:cNvCxnSpPr>
+            <a:cxnSpLocks/>
+          </p:cNvCxnSpPr>
+          <p:nvPr/>
+        </p:nvCxnSpPr>
+        <p:spPr>
+          <a:xfrm>
+            <a:off x="5299688" y="1523445"/>
+            <a:ext cx="0" cy="2549995"/>
+          </a:xfrm>
+          <a:prstGeom prst="line">
+            <a:avLst/>
+          </a:prstGeom>
+          <a:ln w="19050">
+            <a:solidFill>
+              <a:srgbClr val="0070C0"/>
+            </a:solidFill>
+            <a:prstDash val="sysDash"/>
+          </a:ln>
+          <a:effectLst/>
+        </p:spPr>
+        <p:style>
+          <a:lnRef idx="1">
+            <a:schemeClr val="accent1"/>
+          </a:lnRef>
+          <a:fillRef idx="2">
+            <a:schemeClr val="accent1"/>
+          </a:fillRef>
+          <a:effectRef idx="1">
+            <a:schemeClr val="accent1"/>
+          </a:effectRef>
+          <a:fontRef idx="minor">
+            <a:schemeClr val="dk1"/>
+          </a:fontRef>
+        </p:style>
+      </p:cxnSp>
+      <p:sp>
+        <p:nvSpPr>
+          <p:cNvPr id="120" name="Rectangle 119">
+            <a:extLst>
+              <a:ext uri="{FF2B5EF4-FFF2-40B4-BE49-F238E27FC236}">
+                <a16:creationId xmlns:a16="http://schemas.microsoft.com/office/drawing/2014/main" id="{66368E4B-E7F3-44CD-9206-0DDB5DB8FA7A}"/>
               </a:ext>
             </a:extLst>
           </p:cNvPr>
@@ -3635,8 +3688,8 @@
         </p:nvSpPr>
         <p:spPr>
           <a:xfrm>
-            <a:off x="-1664605" y="2411242"/>
-            <a:ext cx="128301" cy="3677018"/>
+            <a:off x="5227681" y="2073190"/>
+            <a:ext cx="150308" cy="1767030"/>
           </a:xfrm>
           <a:prstGeom prst="rect">
             <a:avLst/>
@@ -3670,16 +3723,20 @@
           <a:lstStyle/>
           <a:p>
             <a:pPr algn="ctr"/>
-            <a:endParaRPr lang="en-SG" sz="1400"/>
-          </a:p>
-        </p:txBody>
-      </p:sp>
-      <p:sp>
-        <p:nvSpPr>
-          <p:cNvPr id="118" name="Rectangle 62">
-            <a:extLst>
-              <a:ext uri="{FF2B5EF4-FFF2-40B4-BE49-F238E27FC236}">
-                <a16:creationId xmlns:a16="http://schemas.microsoft.com/office/drawing/2014/main" id="{00F4CA53-45E9-43BC-81ED-0C774C71F934}"/>
+            <a:endParaRPr lang="en-SG" sz="1400">
+              <a:solidFill>
+                <a:schemeClr val="dk1"/>
+              </a:solidFill>
+            </a:endParaRPr>
+          </a:p>
+        </p:txBody>
+      </p:sp>
+      <p:sp>
+        <p:nvSpPr>
+          <p:cNvPr id="121" name="Rectangle 120">
+            <a:extLst>
+              <a:ext uri="{FF2B5EF4-FFF2-40B4-BE49-F238E27FC236}">
+                <a16:creationId xmlns:a16="http://schemas.microsoft.com/office/drawing/2014/main" id="{109C8D33-C932-41B2-B5BB-B5731308E6BF}"/>
               </a:ext>
             </a:extLst>
           </p:cNvPr>
@@ -3688,8 +3745,494 @@
         </p:nvSpPr>
         <p:spPr>
           <a:xfrm>
-            <a:off x="-249584" y="1456558"/>
-            <a:ext cx="1578129" cy="462289"/>
+            <a:off x="7823048" y="3094837"/>
+            <a:ext cx="148354" cy="272819"/>
+          </a:xfrm>
+          <a:prstGeom prst="rect">
+            <a:avLst/>
+          </a:prstGeom>
+          <a:solidFill>
+            <a:srgbClr val="0070C0"/>
+          </a:solidFill>
+          <a:ln>
+            <a:solidFill>
+              <a:srgbClr val="0070C0"/>
+            </a:solidFill>
+          </a:ln>
+          <a:effectLst/>
+        </p:spPr>
+        <p:style>
+          <a:lnRef idx="1">
+            <a:schemeClr val="accent3"/>
+          </a:lnRef>
+          <a:fillRef idx="2">
+            <a:schemeClr val="accent3"/>
+          </a:fillRef>
+          <a:effectRef idx="1">
+            <a:schemeClr val="accent3"/>
+          </a:effectRef>
+          <a:fontRef idx="minor">
+            <a:schemeClr val="dk1"/>
+          </a:fontRef>
+        </p:style>
+        <p:txBody>
+          <a:bodyPr rtlCol="0" anchor="ctr"/>
+          <a:lstStyle/>
+          <a:p>
+            <a:pPr algn="ctr"/>
+            <a:endParaRPr lang="en-SG" sz="1400"/>
+          </a:p>
+        </p:txBody>
+      </p:sp>
+      <p:cxnSp>
+        <p:nvCxnSpPr>
+          <p:cNvPr id="124" name="Straight Arrow Connector 123">
+            <a:extLst>
+              <a:ext uri="{FF2B5EF4-FFF2-40B4-BE49-F238E27FC236}">
+                <a16:creationId xmlns:a16="http://schemas.microsoft.com/office/drawing/2014/main" id="{78076C8D-C746-400A-8B36-9B1E89F822E6}"/>
+              </a:ext>
+            </a:extLst>
+          </p:cNvPr>
+          <p:cNvCxnSpPr>
+            <a:cxnSpLocks/>
+          </p:cNvCxnSpPr>
+          <p:nvPr/>
+        </p:nvCxnSpPr>
+        <p:spPr>
+          <a:xfrm>
+            <a:off x="6934038" y="2878161"/>
+            <a:ext cx="410301" cy="0"/>
+          </a:xfrm>
+          <a:prstGeom prst="straightConnector1">
+            <a:avLst/>
+          </a:prstGeom>
+          <a:ln w="19050">
+            <a:solidFill>
+              <a:srgbClr val="0070C0"/>
+            </a:solidFill>
+            <a:tailEnd type="arrow"/>
+          </a:ln>
+        </p:spPr>
+        <p:style>
+          <a:lnRef idx="1">
+            <a:schemeClr val="accent1"/>
+          </a:lnRef>
+          <a:fillRef idx="0">
+            <a:schemeClr val="accent1"/>
+          </a:fillRef>
+          <a:effectRef idx="0">
+            <a:schemeClr val="accent1"/>
+          </a:effectRef>
+          <a:fontRef idx="minor">
+            <a:schemeClr val="tx1"/>
+          </a:fontRef>
+        </p:style>
+      </p:cxnSp>
+      <p:sp>
+        <p:nvSpPr>
+          <p:cNvPr id="125" name="TextBox 124">
+            <a:extLst>
+              <a:ext uri="{FF2B5EF4-FFF2-40B4-BE49-F238E27FC236}">
+                <a16:creationId xmlns:a16="http://schemas.microsoft.com/office/drawing/2014/main" id="{8DBAC72C-CB04-4327-B7A0-251AA2F6F465}"/>
+              </a:ext>
+            </a:extLst>
+          </p:cNvPr>
+          <p:cNvSpPr txBox="1"/>
+          <p:nvPr/>
+        </p:nvSpPr>
+        <p:spPr>
+          <a:xfrm>
+            <a:off x="4008806" y="4251627"/>
+            <a:ext cx="1976402" cy="215444"/>
+          </a:xfrm>
+          <a:prstGeom prst="rect">
+            <a:avLst/>
+          </a:prstGeom>
+          <a:noFill/>
+        </p:spPr>
+        <p:txBody>
+          <a:bodyPr wrap="square" lIns="0" tIns="0" rIns="0" bIns="0" rtlCol="0">
+            <a:spAutoFit/>
+          </a:bodyPr>
+          <a:lstStyle>
+            <a:defPPr>
+              <a:defRPr lang="en-US"/>
+            </a:defPPr>
+            <a:lvl1pPr algn="r">
+              <a:defRPr sz="1400">
+                <a:solidFill>
+                  <a:srgbClr val="0070C0"/>
+                </a:solidFill>
+              </a:defRPr>
+            </a:lvl1pPr>
+          </a:lstStyle>
+          <a:p>
+            <a:r>
+              <a:rPr lang="en-US" dirty="0"/>
+              <a:t>e</a:t>
+            </a:r>
+            <a:r>
+              <a:rPr lang="en-US"/>
+              <a:t>xecute</a:t>
+            </a:r>
+            <a:r>
+              <a:rPr lang="en-US" dirty="0"/>
+              <a:t>()</a:t>
+            </a:r>
+          </a:p>
+        </p:txBody>
+      </p:sp>
+      <p:cxnSp>
+        <p:nvCxnSpPr>
+          <p:cNvPr id="126" name="Straight Arrow Connector 125">
+            <a:extLst>
+              <a:ext uri="{FF2B5EF4-FFF2-40B4-BE49-F238E27FC236}">
+                <a16:creationId xmlns:a16="http://schemas.microsoft.com/office/drawing/2014/main" id="{3C73F95B-6DE6-418A-B4AB-1807B1053CA6}"/>
+              </a:ext>
+            </a:extLst>
+          </p:cNvPr>
+          <p:cNvCxnSpPr>
+            <a:cxnSpLocks/>
+          </p:cNvCxnSpPr>
+          <p:nvPr/>
+        </p:nvCxnSpPr>
+        <p:spPr>
+          <a:xfrm>
+            <a:off x="6934038" y="3361350"/>
+            <a:ext cx="939583" cy="0"/>
+          </a:xfrm>
+          <a:prstGeom prst="straightConnector1">
+            <a:avLst/>
+          </a:prstGeom>
+          <a:ln w="19050">
+            <a:solidFill>
+              <a:srgbClr val="0070C0"/>
+            </a:solidFill>
+            <a:prstDash val="sysDash"/>
+            <a:headEnd type="arrow" w="med" len="med"/>
+            <a:tailEnd type="none" w="med" len="med"/>
+          </a:ln>
+        </p:spPr>
+        <p:style>
+          <a:lnRef idx="1">
+            <a:schemeClr val="accent1"/>
+          </a:lnRef>
+          <a:fillRef idx="0">
+            <a:schemeClr val="accent1"/>
+          </a:fillRef>
+          <a:effectRef idx="0">
+            <a:schemeClr val="accent1"/>
+          </a:effectRef>
+          <a:fontRef idx="minor">
+            <a:schemeClr val="tx1"/>
+          </a:fontRef>
+        </p:style>
+      </p:cxnSp>
+      <p:cxnSp>
+        <p:nvCxnSpPr>
+          <p:cNvPr id="127" name="Straight Arrow Connector 126">
+            <a:extLst>
+              <a:ext uri="{FF2B5EF4-FFF2-40B4-BE49-F238E27FC236}">
+                <a16:creationId xmlns:a16="http://schemas.microsoft.com/office/drawing/2014/main" id="{23E88E13-55EF-42B8-B59F-E2A5F18E7BE4}"/>
+              </a:ext>
+            </a:extLst>
+          </p:cNvPr>
+          <p:cNvCxnSpPr>
+            <a:cxnSpLocks/>
+            <a:endCxn id="120" idx="2"/>
+          </p:cNvCxnSpPr>
+          <p:nvPr/>
+        </p:nvCxnSpPr>
+        <p:spPr>
+          <a:xfrm flipV="1">
+            <a:off x="3242675" y="3840220"/>
+            <a:ext cx="2060160" cy="13436"/>
+          </a:xfrm>
+          <a:prstGeom prst="straightConnector1">
+            <a:avLst/>
+          </a:prstGeom>
+          <a:ln w="19050">
+            <a:solidFill>
+              <a:srgbClr val="0070C0"/>
+            </a:solidFill>
+            <a:prstDash val="sysDash"/>
+            <a:headEnd type="arrow" w="med" len="med"/>
+            <a:tailEnd type="none" w="med" len="med"/>
+          </a:ln>
+        </p:spPr>
+        <p:style>
+          <a:lnRef idx="1">
+            <a:schemeClr val="accent1"/>
+          </a:lnRef>
+          <a:fillRef idx="0">
+            <a:schemeClr val="accent1"/>
+          </a:fillRef>
+          <a:effectRef idx="0">
+            <a:schemeClr val="accent1"/>
+          </a:effectRef>
+          <a:fontRef idx="minor">
+            <a:schemeClr val="tx1"/>
+          </a:fontRef>
+        </p:style>
+      </p:cxnSp>
+      <p:sp>
+        <p:nvSpPr>
+          <p:cNvPr id="129" name="Rectangle 128">
+            <a:extLst>
+              <a:ext uri="{FF2B5EF4-FFF2-40B4-BE49-F238E27FC236}">
+                <a16:creationId xmlns:a16="http://schemas.microsoft.com/office/drawing/2014/main" id="{B1A93199-3485-4E62-8C45-3EA8EDADD08F}"/>
+              </a:ext>
+            </a:extLst>
+          </p:cNvPr>
+          <p:cNvSpPr/>
+          <p:nvPr/>
+        </p:nvSpPr>
+        <p:spPr>
+          <a:xfrm>
+            <a:off x="7823653" y="4225197"/>
+            <a:ext cx="198841" cy="1359386"/>
+          </a:xfrm>
+          <a:prstGeom prst="rect">
+            <a:avLst/>
+          </a:prstGeom>
+          <a:solidFill>
+            <a:srgbClr val="0070C0"/>
+          </a:solidFill>
+          <a:ln>
+            <a:solidFill>
+              <a:srgbClr val="0070C0"/>
+            </a:solidFill>
+          </a:ln>
+          <a:effectLst/>
+        </p:spPr>
+        <p:style>
+          <a:lnRef idx="1">
+            <a:schemeClr val="accent3"/>
+          </a:lnRef>
+          <a:fillRef idx="2">
+            <a:schemeClr val="accent3"/>
+          </a:fillRef>
+          <a:effectRef idx="1">
+            <a:schemeClr val="accent3"/>
+          </a:effectRef>
+          <a:fontRef idx="minor">
+            <a:schemeClr val="dk1"/>
+          </a:fontRef>
+        </p:style>
+        <p:txBody>
+          <a:bodyPr rtlCol="0" anchor="ctr"/>
+          <a:lstStyle/>
+          <a:p>
+            <a:pPr algn="ctr"/>
+            <a:endParaRPr lang="en-SG" sz="1400"/>
+          </a:p>
+        </p:txBody>
+      </p:sp>
+      <p:sp>
+        <p:nvSpPr>
+          <p:cNvPr id="130" name="TextBox 129">
+            <a:extLst>
+              <a:ext uri="{FF2B5EF4-FFF2-40B4-BE49-F238E27FC236}">
+                <a16:creationId xmlns:a16="http://schemas.microsoft.com/office/drawing/2014/main" id="{6CBFC0C3-1B4F-46AE-8141-DDC44BBBA650}"/>
+              </a:ext>
+            </a:extLst>
+          </p:cNvPr>
+          <p:cNvSpPr txBox="1"/>
+          <p:nvPr/>
+        </p:nvSpPr>
+        <p:spPr>
+          <a:xfrm>
+            <a:off x="3467084" y="1593275"/>
+            <a:ext cx="1667016" cy="430887"/>
+          </a:xfrm>
+          <a:prstGeom prst="rect">
+            <a:avLst/>
+          </a:prstGeom>
+          <a:noFill/>
+        </p:spPr>
+        <p:txBody>
+          <a:bodyPr wrap="square" lIns="0" tIns="0" rIns="0" bIns="0" rtlCol="0">
+            <a:spAutoFit/>
+          </a:bodyPr>
+          <a:lstStyle>
+            <a:defPPr>
+              <a:defRPr lang="en-US"/>
+            </a:defPPr>
+            <a:lvl1pPr algn="r">
+              <a:defRPr sz="1400">
+                <a:solidFill>
+                  <a:srgbClr val="0070C0"/>
+                </a:solidFill>
+              </a:defRPr>
+            </a:lvl1pPr>
+          </a:lstStyle>
+          <a:p>
+            <a:pPr algn="ctr"/>
+            <a:r>
+              <a:rPr lang="en-US" dirty="0" err="1"/>
+              <a:t>parseCommand</a:t>
+            </a:r>
+            <a:r>
+              <a:rPr lang="en-US" dirty="0"/>
+              <a:t>(“add y/1 s/1 c/MA1521”)</a:t>
+            </a:r>
+          </a:p>
+        </p:txBody>
+      </p:sp>
+      <p:sp>
+        <p:nvSpPr>
+          <p:cNvPr id="131" name="TextBox 130">
+            <a:extLst>
+              <a:ext uri="{FF2B5EF4-FFF2-40B4-BE49-F238E27FC236}">
+                <a16:creationId xmlns:a16="http://schemas.microsoft.com/office/drawing/2014/main" id="{DE655E00-4044-4148-A3E9-F567C34AC7E5}"/>
+              </a:ext>
+            </a:extLst>
+          </p:cNvPr>
+          <p:cNvSpPr txBox="1"/>
+          <p:nvPr/>
+        </p:nvSpPr>
+        <p:spPr>
+          <a:xfrm>
+            <a:off x="5053072" y="5351217"/>
+            <a:ext cx="604722" cy="215444"/>
+          </a:xfrm>
+          <a:prstGeom prst="rect">
+            <a:avLst/>
+          </a:prstGeom>
+          <a:noFill/>
+        </p:spPr>
+        <p:txBody>
+          <a:bodyPr wrap="square" lIns="0" tIns="0" rIns="0" bIns="0" rtlCol="0">
+            <a:spAutoFit/>
+          </a:bodyPr>
+          <a:lstStyle>
+            <a:defPPr>
+              <a:defRPr lang="en-US"/>
+            </a:defPPr>
+            <a:lvl1pPr algn="r">
+              <a:defRPr sz="1400">
+                <a:solidFill>
+                  <a:srgbClr val="0070C0"/>
+                </a:solidFill>
+              </a:defRPr>
+            </a:lvl1pPr>
+          </a:lstStyle>
+          <a:p>
+            <a:r>
+              <a:rPr lang="en-US" dirty="0"/>
+              <a:t>result</a:t>
+            </a:r>
+          </a:p>
+        </p:txBody>
+      </p:sp>
+      <p:sp>
+        <p:nvSpPr>
+          <p:cNvPr id="132" name="TextBox 131">
+            <a:extLst>
+              <a:ext uri="{FF2B5EF4-FFF2-40B4-BE49-F238E27FC236}">
+                <a16:creationId xmlns:a16="http://schemas.microsoft.com/office/drawing/2014/main" id="{E0242379-14DF-48F5-BD50-93AA2351080E}"/>
+              </a:ext>
+            </a:extLst>
+          </p:cNvPr>
+          <p:cNvSpPr txBox="1"/>
+          <p:nvPr/>
+        </p:nvSpPr>
+        <p:spPr>
+          <a:xfrm>
+            <a:off x="1748265" y="5432362"/>
+            <a:ext cx="741768" cy="215444"/>
+          </a:xfrm>
+          <a:prstGeom prst="rect">
+            <a:avLst/>
+          </a:prstGeom>
+          <a:noFill/>
+        </p:spPr>
+        <p:txBody>
+          <a:bodyPr wrap="square" lIns="0" tIns="0" rIns="0" bIns="0" rtlCol="0">
+            <a:spAutoFit/>
+          </a:bodyPr>
+          <a:lstStyle>
+            <a:defPPr>
+              <a:defRPr lang="en-US"/>
+            </a:defPPr>
+            <a:lvl1pPr algn="r">
+              <a:defRPr sz="1400">
+                <a:solidFill>
+                  <a:srgbClr val="0070C0"/>
+                </a:solidFill>
+              </a:defRPr>
+            </a:lvl1pPr>
+          </a:lstStyle>
+          <a:p>
+            <a:r>
+              <a:rPr lang="en-US" dirty="0"/>
+              <a:t>result</a:t>
+            </a:r>
+          </a:p>
+        </p:txBody>
+      </p:sp>
+      <p:sp>
+        <p:nvSpPr>
+          <p:cNvPr id="133" name="TextBox 132">
+            <a:extLst>
+              <a:ext uri="{FF2B5EF4-FFF2-40B4-BE49-F238E27FC236}">
+                <a16:creationId xmlns:a16="http://schemas.microsoft.com/office/drawing/2014/main" id="{ACD8F5A8-6114-46AB-BEB6-6B2EE4CDCB4E}"/>
+              </a:ext>
+            </a:extLst>
+          </p:cNvPr>
+          <p:cNvSpPr txBox="1"/>
+          <p:nvPr/>
+        </p:nvSpPr>
+        <p:spPr>
+          <a:xfrm>
+            <a:off x="4215828" y="3606444"/>
+            <a:ext cx="214493" cy="215444"/>
+          </a:xfrm>
+          <a:prstGeom prst="rect">
+            <a:avLst/>
+          </a:prstGeom>
+          <a:noFill/>
+        </p:spPr>
+        <p:txBody>
+          <a:bodyPr wrap="square" lIns="0" tIns="0" rIns="0" bIns="0" rtlCol="0">
+            <a:spAutoFit/>
+          </a:bodyPr>
+          <a:lstStyle>
+            <a:defPPr>
+              <a:defRPr lang="en-US"/>
+            </a:defPPr>
+            <a:lvl1pPr algn="r">
+              <a:defRPr sz="1400">
+                <a:solidFill>
+                  <a:srgbClr val="0070C0"/>
+                </a:solidFill>
+              </a:defRPr>
+            </a:lvl1pPr>
+          </a:lstStyle>
+          <a:p>
+            <a:r>
+              <a:rPr lang="en-US" dirty="0"/>
+              <a:t>a</a:t>
+            </a:r>
+          </a:p>
+        </p:txBody>
+      </p:sp>
+      <p:sp>
+        <p:nvSpPr>
+          <p:cNvPr id="134" name="Rectangle 62">
+            <a:extLst>
+              <a:ext uri="{FF2B5EF4-FFF2-40B4-BE49-F238E27FC236}">
+                <a16:creationId xmlns:a16="http://schemas.microsoft.com/office/drawing/2014/main" id="{1ABC32DA-C6BB-4BAC-A912-1641CF12676D}"/>
+              </a:ext>
+            </a:extLst>
+          </p:cNvPr>
+          <p:cNvSpPr/>
+          <p:nvPr/>
+        </p:nvSpPr>
+        <p:spPr>
+          <a:xfrm>
+            <a:off x="7333143" y="2631413"/>
+            <a:ext cx="1064598" cy="456214"/>
           </a:xfrm>
           <a:prstGeom prst="rect">
             <a:avLst/>
@@ -3729,31 +4272,22 @@
                   <a:schemeClr val="bg1"/>
                 </a:solidFill>
               </a:rPr>
-              <a:t>:</a:t>
-            </a:r>
-            <a:r>
-              <a:rPr lang="en-US" sz="1600" dirty="0" err="1">
+              <a:t>a:Add</a:t>
+            </a:r>
+            <a:br>
+              <a:rPr lang="en-US" sz="1600" dirty="0">
                 <a:solidFill>
                   <a:schemeClr val="bg1"/>
                 </a:solidFill>
               </a:rPr>
-              <a:t>ModulePlanner</a:t>
-            </a:r>
-            <a:endParaRPr lang="en-US" sz="1600" dirty="0">
-              <a:solidFill>
-                <a:schemeClr val="bg1"/>
-              </a:solidFill>
-            </a:endParaRPr>
-          </a:p>
-          <a:p>
-            <a:pPr algn="ctr"/>
+            </a:br>
             <a:r>
               <a:rPr lang="en-US" sz="1600" dirty="0">
                 <a:solidFill>
                   <a:schemeClr val="bg1"/>
                 </a:solidFill>
               </a:rPr>
-              <a:t>Parser</a:t>
+              <a:t>Command</a:t>
             </a:r>
             <a:endParaRPr lang="en-SG" sz="1600" dirty="0">
               <a:solidFill>
@@ -3765,10 +4299,10 @@
       </p:sp>
       <p:cxnSp>
         <p:nvCxnSpPr>
-          <p:cNvPr id="119" name="Straight Connector 118">
-            <a:extLst>
-              <a:ext uri="{FF2B5EF4-FFF2-40B4-BE49-F238E27FC236}">
-                <a16:creationId xmlns:a16="http://schemas.microsoft.com/office/drawing/2014/main" id="{DB16570C-D1E2-4876-87B8-6A5754785BB8}"/>
+          <p:cNvPr id="135" name="Straight Arrow Connector 134">
+            <a:extLst>
+              <a:ext uri="{FF2B5EF4-FFF2-40B4-BE49-F238E27FC236}">
+                <a16:creationId xmlns:a16="http://schemas.microsoft.com/office/drawing/2014/main" id="{5B6AED09-45E1-44E6-A1C7-9080BE887412}"/>
               </a:ext>
             </a:extLst>
           </p:cNvPr>
@@ -3779,10 +4313,99 @@
         </p:nvCxnSpPr>
         <p:spPr>
           <a:xfrm>
-            <a:off x="544808" y="1948608"/>
-            <a:ext cx="0" cy="2549995"/>
-          </a:xfrm>
-          <a:prstGeom prst="line">
+            <a:off x="3145298" y="4219048"/>
+            <a:ext cx="4677750" cy="15926"/>
+          </a:xfrm>
+          <a:prstGeom prst="straightConnector1">
+            <a:avLst/>
+          </a:prstGeom>
+          <a:ln w="19050">
+            <a:solidFill>
+              <a:srgbClr val="0070C0"/>
+            </a:solidFill>
+            <a:tailEnd type="arrow"/>
+          </a:ln>
+        </p:spPr>
+        <p:style>
+          <a:lnRef idx="1">
+            <a:schemeClr val="accent1"/>
+          </a:lnRef>
+          <a:fillRef idx="0">
+            <a:schemeClr val="accent1"/>
+          </a:fillRef>
+          <a:effectRef idx="0">
+            <a:schemeClr val="accent1"/>
+          </a:effectRef>
+          <a:fontRef idx="minor">
+            <a:schemeClr val="tx1"/>
+          </a:fontRef>
+        </p:style>
+      </p:cxnSp>
+      <p:cxnSp>
+        <p:nvCxnSpPr>
+          <p:cNvPr id="136" name="Straight Arrow Connector 135">
+            <a:extLst>
+              <a:ext uri="{FF2B5EF4-FFF2-40B4-BE49-F238E27FC236}">
+                <a16:creationId xmlns:a16="http://schemas.microsoft.com/office/drawing/2014/main" id="{4F37C6BB-44FE-48E4-B5BA-5DFD70067690}"/>
+              </a:ext>
+            </a:extLst>
+          </p:cNvPr>
+          <p:cNvCxnSpPr>
+            <a:cxnSpLocks/>
+          </p:cNvCxnSpPr>
+          <p:nvPr/>
+        </p:nvCxnSpPr>
+        <p:spPr>
+          <a:xfrm>
+            <a:off x="3242675" y="2052568"/>
+            <a:ext cx="1977650" cy="14658"/>
+          </a:xfrm>
+          <a:prstGeom prst="straightConnector1">
+            <a:avLst/>
+          </a:prstGeom>
+          <a:ln w="19050">
+            <a:solidFill>
+              <a:srgbClr val="0070C0"/>
+            </a:solidFill>
+            <a:tailEnd type="arrow"/>
+          </a:ln>
+        </p:spPr>
+        <p:style>
+          <a:lnRef idx="1">
+            <a:schemeClr val="accent1"/>
+          </a:lnRef>
+          <a:fillRef idx="0">
+            <a:schemeClr val="accent1"/>
+          </a:fillRef>
+          <a:effectRef idx="0">
+            <a:schemeClr val="accent1"/>
+          </a:effectRef>
+          <a:fontRef idx="minor">
+            <a:schemeClr val="tx1"/>
+          </a:fontRef>
+        </p:style>
+      </p:cxnSp>
+      <p:cxnSp>
+        <p:nvCxnSpPr>
+          <p:cNvPr id="137" name="Straight Arrow Connector 136">
+            <a:extLst>
+              <a:ext uri="{FF2B5EF4-FFF2-40B4-BE49-F238E27FC236}">
+                <a16:creationId xmlns:a16="http://schemas.microsoft.com/office/drawing/2014/main" id="{EB66477F-1112-42BB-B7F2-57B0BED347A0}"/>
+              </a:ext>
+            </a:extLst>
+          </p:cNvPr>
+          <p:cNvCxnSpPr>
+            <a:cxnSpLocks/>
+            <a:endCxn id="129" idx="2"/>
+          </p:cNvCxnSpPr>
+          <p:nvPr/>
+        </p:nvCxnSpPr>
+        <p:spPr>
+          <a:xfrm>
+            <a:off x="3235335" y="5557623"/>
+            <a:ext cx="4687739" cy="26960"/>
+          </a:xfrm>
+          <a:prstGeom prst="straightConnector1">
             <a:avLst/>
           </a:prstGeom>
           <a:ln w="19050">
@@ -3790,30 +4413,120 @@
               <a:srgbClr val="0070C0"/>
             </a:solidFill>
             <a:prstDash val="sysDash"/>
+            <a:headEnd type="arrow" w="med" len="med"/>
+            <a:tailEnd type="none" w="med" len="med"/>
+          </a:ln>
+        </p:spPr>
+        <p:style>
+          <a:lnRef idx="1">
+            <a:schemeClr val="accent1"/>
+          </a:lnRef>
+          <a:fillRef idx="0">
+            <a:schemeClr val="accent1"/>
+          </a:fillRef>
+          <a:effectRef idx="0">
+            <a:schemeClr val="accent1"/>
+          </a:effectRef>
+          <a:fontRef idx="minor">
+            <a:schemeClr val="tx1"/>
+          </a:fontRef>
+        </p:style>
+      </p:cxnSp>
+      <p:sp>
+        <p:nvSpPr>
+          <p:cNvPr id="138" name="Rectangle 62">
+            <a:extLst>
+              <a:ext uri="{FF2B5EF4-FFF2-40B4-BE49-F238E27FC236}">
+                <a16:creationId xmlns:a16="http://schemas.microsoft.com/office/drawing/2014/main" id="{EB146C36-3369-4DF9-A27E-789B95FC6813}"/>
+              </a:ext>
+            </a:extLst>
+          </p:cNvPr>
+          <p:cNvSpPr/>
+          <p:nvPr/>
+        </p:nvSpPr>
+        <p:spPr>
+          <a:xfrm>
+            <a:off x="5900450" y="1838168"/>
+            <a:ext cx="1624719" cy="427051"/>
+          </a:xfrm>
+          <a:prstGeom prst="rect">
+            <a:avLst/>
+          </a:prstGeom>
+          <a:solidFill>
+            <a:srgbClr val="0070C0"/>
+          </a:solidFill>
+          <a:ln w="19050">
+            <a:solidFill>
+              <a:srgbClr val="0070C0"/>
+            </a:solidFill>
           </a:ln>
           <a:effectLst/>
         </p:spPr>
         <p:style>
           <a:lnRef idx="1">
-            <a:schemeClr val="accent1"/>
+            <a:schemeClr val="accent2"/>
           </a:lnRef>
           <a:fillRef idx="2">
-            <a:schemeClr val="accent1"/>
+            <a:schemeClr val="accent2"/>
           </a:fillRef>
           <a:effectRef idx="1">
-            <a:schemeClr val="accent1"/>
+            <a:schemeClr val="accent2"/>
           </a:effectRef>
           <a:fontRef idx="minor">
             <a:schemeClr val="dk1"/>
           </a:fontRef>
         </p:style>
-      </p:cxnSp>
-      <p:sp>
-        <p:nvSpPr>
-          <p:cNvPr id="120" name="Rectangle 119">
-            <a:extLst>
-              <a:ext uri="{FF2B5EF4-FFF2-40B4-BE49-F238E27FC236}">
-                <a16:creationId xmlns:a16="http://schemas.microsoft.com/office/drawing/2014/main" id="{66368E4B-E7F3-44CD-9206-0DDB5DB8FA7A}"/>
+        <p:txBody>
+          <a:bodyPr rtlCol="0" anchor="ctr"/>
+          <a:lstStyle/>
+          <a:p>
+            <a:pPr algn="ctr"/>
+            <a:r>
+              <a:rPr lang="en-US" sz="1600" dirty="0">
+                <a:solidFill>
+                  <a:schemeClr val="bg1"/>
+                </a:solidFill>
+              </a:rPr>
+              <a:t>:</a:t>
+            </a:r>
+            <a:r>
+              <a:rPr lang="en-US" sz="1600" dirty="0" err="1">
+                <a:solidFill>
+                  <a:schemeClr val="bg1"/>
+                </a:solidFill>
+              </a:rPr>
+              <a:t>AddCommand</a:t>
+            </a:r>
+            <a:endParaRPr lang="en-US" sz="1600" dirty="0">
+              <a:solidFill>
+                <a:schemeClr val="bg1"/>
+              </a:solidFill>
+            </a:endParaRPr>
+          </a:p>
+          <a:p>
+            <a:pPr algn="ctr"/>
+            <a:r>
+              <a:rPr lang="en-US" sz="1600" dirty="0">
+                <a:solidFill>
+                  <a:schemeClr val="bg1"/>
+                </a:solidFill>
+              </a:rPr>
+              <a:t>Parser</a:t>
+            </a:r>
+            <a:endParaRPr lang="en-SG" sz="1600" dirty="0">
+              <a:solidFill>
+                <a:schemeClr val="bg1"/>
+              </a:solidFill>
+            </a:endParaRPr>
+          </a:p>
+        </p:txBody>
+      </p:sp>
+      <p:sp>
+        <p:nvSpPr>
+          <p:cNvPr id="139" name="Rectangle 138">
+            <a:extLst>
+              <a:ext uri="{FF2B5EF4-FFF2-40B4-BE49-F238E27FC236}">
+                <a16:creationId xmlns:a16="http://schemas.microsoft.com/office/drawing/2014/main" id="{31ACF7E4-D1AA-4858-83F4-CFF87883D0E4}"/>
               </a:ext>
             </a:extLst>
           </p:cNvPr>
@@ -3822,8 +4535,8 @@
         </p:nvSpPr>
         <p:spPr>
           <a:xfrm>
-            <a:off x="472801" y="2498353"/>
-            <a:ext cx="150308" cy="1767030"/>
+            <a:off x="6763395" y="2284016"/>
+            <a:ext cx="200378" cy="121744"/>
           </a:xfrm>
           <a:prstGeom prst="rect">
             <a:avLst/>
@@ -3857,20 +4570,152 @@
           <a:lstStyle/>
           <a:p>
             <a:pPr algn="ctr"/>
-            <a:endParaRPr lang="en-SG" sz="1400">
-              <a:solidFill>
-                <a:schemeClr val="dk1"/>
-              </a:solidFill>
-            </a:endParaRPr>
-          </a:p>
-        </p:txBody>
-      </p:sp>
-      <p:sp>
-        <p:nvSpPr>
-          <p:cNvPr id="121" name="Rectangle 120">
-            <a:extLst>
-              <a:ext uri="{FF2B5EF4-FFF2-40B4-BE49-F238E27FC236}">
-                <a16:creationId xmlns:a16="http://schemas.microsoft.com/office/drawing/2014/main" id="{109C8D33-C932-41B2-B5BB-B5731308E6BF}"/>
+            <a:endParaRPr lang="en-SG" sz="1400"/>
+          </a:p>
+        </p:txBody>
+      </p:sp>
+      <p:cxnSp>
+        <p:nvCxnSpPr>
+          <p:cNvPr id="140" name="Straight Arrow Connector 139">
+            <a:extLst>
+              <a:ext uri="{FF2B5EF4-FFF2-40B4-BE49-F238E27FC236}">
+                <a16:creationId xmlns:a16="http://schemas.microsoft.com/office/drawing/2014/main" id="{7756FB46-0A64-494B-BE17-52F664D4E229}"/>
+              </a:ext>
+            </a:extLst>
+          </p:cNvPr>
+          <p:cNvCxnSpPr>
+            <a:cxnSpLocks/>
+          </p:cNvCxnSpPr>
+          <p:nvPr/>
+        </p:nvCxnSpPr>
+        <p:spPr>
+          <a:xfrm>
+            <a:off x="5374614" y="2067226"/>
+            <a:ext cx="510923" cy="32"/>
+          </a:xfrm>
+          <a:prstGeom prst="straightConnector1">
+            <a:avLst/>
+          </a:prstGeom>
+          <a:ln w="19050">
+            <a:solidFill>
+              <a:srgbClr val="0070C0"/>
+            </a:solidFill>
+            <a:tailEnd type="arrow"/>
+          </a:ln>
+        </p:spPr>
+        <p:style>
+          <a:lnRef idx="1">
+            <a:schemeClr val="accent1"/>
+          </a:lnRef>
+          <a:fillRef idx="0">
+            <a:schemeClr val="accent1"/>
+          </a:fillRef>
+          <a:effectRef idx="0">
+            <a:schemeClr val="accent1"/>
+          </a:effectRef>
+          <a:fontRef idx="minor">
+            <a:schemeClr val="tx1"/>
+          </a:fontRef>
+        </p:style>
+      </p:cxnSp>
+      <p:cxnSp>
+        <p:nvCxnSpPr>
+          <p:cNvPr id="141" name="Straight Arrow Connector 140">
+            <a:extLst>
+              <a:ext uri="{FF2B5EF4-FFF2-40B4-BE49-F238E27FC236}">
+                <a16:creationId xmlns:a16="http://schemas.microsoft.com/office/drawing/2014/main" id="{83BB86EC-B24D-4549-876A-3562D3605AA1}"/>
+              </a:ext>
+            </a:extLst>
+          </p:cNvPr>
+          <p:cNvCxnSpPr>
+            <a:cxnSpLocks/>
+          </p:cNvCxnSpPr>
+          <p:nvPr/>
+        </p:nvCxnSpPr>
+        <p:spPr>
+          <a:xfrm flipV="1">
+            <a:off x="5371696" y="2400795"/>
+            <a:ext cx="1375508" cy="14398"/>
+          </a:xfrm>
+          <a:prstGeom prst="straightConnector1">
+            <a:avLst/>
+          </a:prstGeom>
+          <a:ln w="19050">
+            <a:solidFill>
+              <a:srgbClr val="0070C0"/>
+            </a:solidFill>
+            <a:prstDash val="sysDash"/>
+            <a:headEnd type="arrow" w="med" len="med"/>
+            <a:tailEnd type="none" w="med" len="med"/>
+          </a:ln>
+        </p:spPr>
+        <p:style>
+          <a:lnRef idx="1">
+            <a:schemeClr val="accent1"/>
+          </a:lnRef>
+          <a:fillRef idx="0">
+            <a:schemeClr val="accent1"/>
+          </a:fillRef>
+          <a:effectRef idx="0">
+            <a:schemeClr val="accent1"/>
+          </a:effectRef>
+          <a:fontRef idx="minor">
+            <a:schemeClr val="tx1"/>
+          </a:fontRef>
+        </p:style>
+      </p:cxnSp>
+      <p:cxnSp>
+        <p:nvCxnSpPr>
+          <p:cNvPr id="142" name="Straight Connector 141">
+            <a:extLst>
+              <a:ext uri="{FF2B5EF4-FFF2-40B4-BE49-F238E27FC236}">
+                <a16:creationId xmlns:a16="http://schemas.microsoft.com/office/drawing/2014/main" id="{4FC4DF6D-B40E-46F8-AB61-C4D5B6EF6203}"/>
+              </a:ext>
+            </a:extLst>
+          </p:cNvPr>
+          <p:cNvCxnSpPr>
+            <a:cxnSpLocks/>
+            <a:stCxn id="139" idx="2"/>
+          </p:cNvCxnSpPr>
+          <p:nvPr/>
+        </p:nvCxnSpPr>
+        <p:spPr>
+          <a:xfrm flipH="1">
+            <a:off x="6852444" y="2405760"/>
+            <a:ext cx="11140" cy="1733460"/>
+          </a:xfrm>
+          <a:prstGeom prst="line">
+            <a:avLst/>
+          </a:prstGeom>
+          <a:ln w="19050">
+            <a:solidFill>
+              <a:srgbClr val="0070C0"/>
+            </a:solidFill>
+            <a:prstDash val="sysDash"/>
+          </a:ln>
+          <a:effectLst/>
+        </p:spPr>
+        <p:style>
+          <a:lnRef idx="1">
+            <a:schemeClr val="accent1"/>
+          </a:lnRef>
+          <a:fillRef idx="2">
+            <a:schemeClr val="accent1"/>
+          </a:fillRef>
+          <a:effectRef idx="1">
+            <a:schemeClr val="accent1"/>
+          </a:effectRef>
+          <a:fontRef idx="minor">
+            <a:schemeClr val="dk1"/>
+          </a:fontRef>
+        </p:style>
+      </p:cxnSp>
+      <p:sp>
+        <p:nvSpPr>
+          <p:cNvPr id="143" name="Rectangle 142">
+            <a:extLst>
+              <a:ext uri="{FF2B5EF4-FFF2-40B4-BE49-F238E27FC236}">
+                <a16:creationId xmlns:a16="http://schemas.microsoft.com/office/drawing/2014/main" id="{46A27291-B3A0-4D67-A52C-D345373EA45C}"/>
               </a:ext>
             </a:extLst>
           </p:cNvPr>
@@ -3879,8 +4724,8 @@
         </p:nvSpPr>
         <p:spPr>
           <a:xfrm>
-            <a:off x="3068168" y="3520000"/>
-            <a:ext cx="148354" cy="272819"/>
+            <a:off x="6772716" y="2624078"/>
+            <a:ext cx="157039" cy="859820"/>
           </a:xfrm>
           <a:prstGeom prst="rect">
             <a:avLst/>
@@ -3914,16 +4759,16 @@
           <a:lstStyle/>
           <a:p>
             <a:pPr algn="ctr"/>
-            <a:endParaRPr lang="en-SG" sz="1400"/>
+            <a:endParaRPr lang="en-SG" sz="1400" dirty="0"/>
           </a:p>
         </p:txBody>
       </p:sp>
       <p:cxnSp>
         <p:nvCxnSpPr>
-          <p:cNvPr id="122" name="Straight Arrow Connector 121">
-            <a:extLst>
-              <a:ext uri="{FF2B5EF4-FFF2-40B4-BE49-F238E27FC236}">
-                <a16:creationId xmlns:a16="http://schemas.microsoft.com/office/drawing/2014/main" id="{8CBC86FC-53A9-46DF-A13A-53D74E1D3DDF}"/>
+          <p:cNvPr id="144" name="Straight Arrow Connector 143">
+            <a:extLst>
+              <a:ext uri="{FF2B5EF4-FFF2-40B4-BE49-F238E27FC236}">
+                <a16:creationId xmlns:a16="http://schemas.microsoft.com/office/drawing/2014/main" id="{A95C9CFD-C229-4D87-8988-DEDF0C7A1F08}"/>
               </a:ext>
             </a:extLst>
           </p:cNvPr>
@@ -3934,52 +4779,8 @@
         </p:nvCxnSpPr>
         <p:spPr>
           <a:xfrm>
-            <a:off x="-3298541" y="2411242"/>
-            <a:ext cx="1633937" cy="0"/>
-          </a:xfrm>
-          <a:prstGeom prst="straightConnector1">
-            <a:avLst/>
-          </a:prstGeom>
-          <a:ln w="19050">
-            <a:solidFill>
-              <a:srgbClr val="00B050"/>
-            </a:solidFill>
-            <a:tailEnd type="arrow"/>
-          </a:ln>
-        </p:spPr>
-        <p:style>
-          <a:lnRef idx="1">
-            <a:schemeClr val="accent1"/>
-          </a:lnRef>
-          <a:fillRef idx="0">
-            <a:schemeClr val="accent1"/>
-          </a:fillRef>
-          <a:effectRef idx="0">
-            <a:schemeClr val="accent1"/>
-          </a:effectRef>
-          <a:fontRef idx="minor">
-            <a:schemeClr val="tx1"/>
-          </a:fontRef>
-        </p:style>
-      </p:cxnSp>
-      <p:cxnSp>
-        <p:nvCxnSpPr>
-          <p:cNvPr id="124" name="Straight Arrow Connector 123">
-            <a:extLst>
-              <a:ext uri="{FF2B5EF4-FFF2-40B4-BE49-F238E27FC236}">
-                <a16:creationId xmlns:a16="http://schemas.microsoft.com/office/drawing/2014/main" id="{78076C8D-C746-400A-8B36-9B1E89F822E6}"/>
-              </a:ext>
-            </a:extLst>
-          </p:cNvPr>
-          <p:cNvCxnSpPr>
-            <a:cxnSpLocks/>
-          </p:cNvCxnSpPr>
-          <p:nvPr/>
-        </p:nvCxnSpPr>
-        <p:spPr>
-          <a:xfrm>
-            <a:off x="2179158" y="3303324"/>
-            <a:ext cx="410301" cy="0"/>
+            <a:off x="5379393" y="2634454"/>
+            <a:ext cx="1384002" cy="2607"/>
           </a:xfrm>
           <a:prstGeom prst="straightConnector1">
             <a:avLst/>
@@ -4006,66 +4807,12 @@
           </a:fontRef>
         </p:style>
       </p:cxnSp>
-      <p:sp>
-        <p:nvSpPr>
-          <p:cNvPr id="125" name="TextBox 124">
-            <a:extLst>
-              <a:ext uri="{FF2B5EF4-FFF2-40B4-BE49-F238E27FC236}">
-                <a16:creationId xmlns:a16="http://schemas.microsoft.com/office/drawing/2014/main" id="{8DBAC72C-CB04-4327-B7A0-251AA2F6F465}"/>
-              </a:ext>
-            </a:extLst>
-          </p:cNvPr>
-          <p:cNvSpPr txBox="1"/>
-          <p:nvPr/>
-        </p:nvSpPr>
-        <p:spPr>
-          <a:xfrm>
-            <a:off x="-746074" y="4676790"/>
-            <a:ext cx="1976402" cy="215444"/>
-          </a:xfrm>
-          <a:prstGeom prst="rect">
-            <a:avLst/>
-          </a:prstGeom>
-          <a:noFill/>
-        </p:spPr>
-        <p:txBody>
-          <a:bodyPr wrap="square" lIns="0" tIns="0" rIns="0" bIns="0" rtlCol="0">
-            <a:spAutoFit/>
-          </a:bodyPr>
-          <a:lstStyle>
-            <a:defPPr>
-              <a:defRPr lang="en-US"/>
-            </a:defPPr>
-            <a:lvl1pPr algn="r">
-              <a:defRPr sz="1400">
-                <a:solidFill>
-                  <a:srgbClr val="0070C0"/>
-                </a:solidFill>
-              </a:defRPr>
-            </a:lvl1pPr>
-          </a:lstStyle>
-          <a:p>
-            <a:r>
-              <a:rPr lang="en-US" dirty="0"/>
-              <a:t>e</a:t>
-            </a:r>
-            <a:r>
-              <a:rPr lang="en-US"/>
-              <a:t>xecute</a:t>
-            </a:r>
-            <a:r>
-              <a:rPr lang="en-US" dirty="0"/>
-              <a:t>()</a:t>
-            </a:r>
-          </a:p>
-        </p:txBody>
-      </p:sp>
       <p:cxnSp>
         <p:nvCxnSpPr>
-          <p:cNvPr id="126" name="Straight Arrow Connector 125">
-            <a:extLst>
-              <a:ext uri="{FF2B5EF4-FFF2-40B4-BE49-F238E27FC236}">
-                <a16:creationId xmlns:a16="http://schemas.microsoft.com/office/drawing/2014/main" id="{3C73F95B-6DE6-418A-B4AB-1807B1053CA6}"/>
+          <p:cNvPr id="145" name="Straight Arrow Connector 144">
+            <a:extLst>
+              <a:ext uri="{FF2B5EF4-FFF2-40B4-BE49-F238E27FC236}">
+                <a16:creationId xmlns:a16="http://schemas.microsoft.com/office/drawing/2014/main" id="{CCC50A13-4675-4FBA-B21F-CF9704D0A89F}"/>
               </a:ext>
             </a:extLst>
           </p:cNvPr>
@@ -4076,8 +4823,8 @@
         </p:nvCxnSpPr>
         <p:spPr>
           <a:xfrm>
-            <a:off x="2179158" y="3786513"/>
-            <a:ext cx="939583" cy="0"/>
+            <a:off x="5375591" y="3472653"/>
+            <a:ext cx="1371613" cy="0"/>
           </a:xfrm>
           <a:prstGeom prst="straightConnector1">
             <a:avLst/>
@@ -4106,158 +4853,12 @@
           </a:fontRef>
         </p:style>
       </p:cxnSp>
-      <p:cxnSp>
-        <p:nvCxnSpPr>
-          <p:cNvPr id="127" name="Straight Arrow Connector 126">
-            <a:extLst>
-              <a:ext uri="{FF2B5EF4-FFF2-40B4-BE49-F238E27FC236}">
-                <a16:creationId xmlns:a16="http://schemas.microsoft.com/office/drawing/2014/main" id="{23E88E13-55EF-42B8-B59F-E2A5F18E7BE4}"/>
-              </a:ext>
-            </a:extLst>
-          </p:cNvPr>
-          <p:cNvCxnSpPr>
-            <a:cxnSpLocks/>
-            <a:endCxn id="120" idx="2"/>
-          </p:cNvCxnSpPr>
-          <p:nvPr/>
-        </p:nvCxnSpPr>
-        <p:spPr>
-          <a:xfrm flipV="1">
-            <a:off x="-1512205" y="4265383"/>
-            <a:ext cx="2060160" cy="13436"/>
-          </a:xfrm>
-          <a:prstGeom prst="straightConnector1">
-            <a:avLst/>
-          </a:prstGeom>
-          <a:ln w="19050">
-            <a:solidFill>
-              <a:srgbClr val="0070C0"/>
-            </a:solidFill>
-            <a:prstDash val="sysDash"/>
-            <a:headEnd type="arrow" w="med" len="med"/>
-            <a:tailEnd type="none" w="med" len="med"/>
-          </a:ln>
-        </p:spPr>
-        <p:style>
-          <a:lnRef idx="1">
-            <a:schemeClr val="accent1"/>
-          </a:lnRef>
-          <a:fillRef idx="0">
-            <a:schemeClr val="accent1"/>
-          </a:fillRef>
-          <a:effectRef idx="0">
-            <a:schemeClr val="accent1"/>
-          </a:effectRef>
-          <a:fontRef idx="minor">
-            <a:schemeClr val="tx1"/>
-          </a:fontRef>
-        </p:style>
-      </p:cxnSp>
-      <p:cxnSp>
-        <p:nvCxnSpPr>
-          <p:cNvPr id="128" name="Straight Arrow Connector 127">
-            <a:extLst>
-              <a:ext uri="{FF2B5EF4-FFF2-40B4-BE49-F238E27FC236}">
-                <a16:creationId xmlns:a16="http://schemas.microsoft.com/office/drawing/2014/main" id="{BC72D185-C39D-43C9-A3F7-73DABA7D34B7}"/>
-              </a:ext>
-            </a:extLst>
-          </p:cNvPr>
-          <p:cNvCxnSpPr>
-            <a:cxnSpLocks/>
-          </p:cNvCxnSpPr>
-          <p:nvPr/>
-        </p:nvCxnSpPr>
-        <p:spPr>
-          <a:xfrm>
-            <a:off x="-3459928" y="6088260"/>
-            <a:ext cx="1795323" cy="0"/>
-          </a:xfrm>
-          <a:prstGeom prst="straightConnector1">
-            <a:avLst/>
-          </a:prstGeom>
-          <a:ln w="19050">
-            <a:solidFill>
-              <a:schemeClr val="accent1"/>
-            </a:solidFill>
-            <a:prstDash val="sysDash"/>
-            <a:headEnd type="arrow" w="med" len="med"/>
-            <a:tailEnd type="none" w="med" len="med"/>
-          </a:ln>
-        </p:spPr>
-        <p:style>
-          <a:lnRef idx="1">
-            <a:schemeClr val="accent1"/>
-          </a:lnRef>
-          <a:fillRef idx="0">
-            <a:schemeClr val="accent1"/>
-          </a:fillRef>
-          <a:effectRef idx="0">
-            <a:schemeClr val="accent1"/>
-          </a:effectRef>
-          <a:fontRef idx="minor">
-            <a:schemeClr val="tx1"/>
-          </a:fontRef>
-        </p:style>
-      </p:cxnSp>
-      <p:sp>
-        <p:nvSpPr>
-          <p:cNvPr id="129" name="Rectangle 128">
-            <a:extLst>
-              <a:ext uri="{FF2B5EF4-FFF2-40B4-BE49-F238E27FC236}">
-                <a16:creationId xmlns:a16="http://schemas.microsoft.com/office/drawing/2014/main" id="{B1A93199-3485-4E62-8C45-3EA8EDADD08F}"/>
-              </a:ext>
-            </a:extLst>
-          </p:cNvPr>
-          <p:cNvSpPr/>
-          <p:nvPr/>
-        </p:nvSpPr>
-        <p:spPr>
-          <a:xfrm>
-            <a:off x="3068773" y="4650360"/>
-            <a:ext cx="198841" cy="1359386"/>
-          </a:xfrm>
-          <a:prstGeom prst="rect">
-            <a:avLst/>
-          </a:prstGeom>
-          <a:solidFill>
-            <a:srgbClr val="0070C0"/>
-          </a:solidFill>
-          <a:ln>
-            <a:solidFill>
-              <a:srgbClr val="0070C0"/>
-            </a:solidFill>
-          </a:ln>
-          <a:effectLst/>
-        </p:spPr>
-        <p:style>
-          <a:lnRef idx="1">
-            <a:schemeClr val="accent3"/>
-          </a:lnRef>
-          <a:fillRef idx="2">
-            <a:schemeClr val="accent3"/>
-          </a:fillRef>
-          <a:effectRef idx="1">
-            <a:schemeClr val="accent3"/>
-          </a:effectRef>
-          <a:fontRef idx="minor">
-            <a:schemeClr val="dk1"/>
-          </a:fontRef>
-        </p:style>
-        <p:txBody>
-          <a:bodyPr rtlCol="0" anchor="ctr"/>
-          <a:lstStyle/>
-          <a:p>
-            <a:pPr algn="ctr"/>
-            <a:endParaRPr lang="en-SG" sz="1400"/>
-          </a:p>
-        </p:txBody>
-      </p:sp>
-      <p:sp>
-        <p:nvSpPr>
-          <p:cNvPr id="130" name="TextBox 129">
-            <a:extLst>
-              <a:ext uri="{FF2B5EF4-FFF2-40B4-BE49-F238E27FC236}">
-                <a16:creationId xmlns:a16="http://schemas.microsoft.com/office/drawing/2014/main" id="{6CBFC0C3-1B4F-46AE-8141-DDC44BBBA650}"/>
+      <p:sp>
+        <p:nvSpPr>
+          <p:cNvPr id="146" name="TextBox 145">
+            <a:extLst>
+              <a:ext uri="{FF2B5EF4-FFF2-40B4-BE49-F238E27FC236}">
+                <a16:creationId xmlns:a16="http://schemas.microsoft.com/office/drawing/2014/main" id="{D3CA5C27-6475-41BF-B5C8-714115F05346}"/>
               </a:ext>
             </a:extLst>
           </p:cNvPr>
@@ -4266,8 +4867,8 @@
         </p:nvSpPr>
         <p:spPr>
           <a:xfrm>
-            <a:off x="-1287796" y="2018438"/>
-            <a:ext cx="1667016" cy="430887"/>
+            <a:off x="5396301" y="2707020"/>
+            <a:ext cx="1302992" cy="430887"/>
           </a:xfrm>
           <a:prstGeom prst="rect">
             <a:avLst/>
@@ -4293,22 +4894,18 @@
           <a:p>
             <a:pPr algn="ctr"/>
             <a:r>
-              <a:rPr lang="en-US" dirty="0" err="1"/>
-              <a:t>parseCommand</a:t>
-            </a:r>
-            <a:r>
               <a:rPr lang="en-US" dirty="0"/>
-              <a:t>(“add y/1 s/1 c/MA1521”)</a:t>
-            </a:r>
-          </a:p>
-        </p:txBody>
-      </p:sp>
-      <p:sp>
-        <p:nvSpPr>
-          <p:cNvPr id="131" name="TextBox 130">
-            <a:extLst>
-              <a:ext uri="{FF2B5EF4-FFF2-40B4-BE49-F238E27FC236}">
-                <a16:creationId xmlns:a16="http://schemas.microsoft.com/office/drawing/2014/main" id="{DE655E00-4044-4148-A3E9-F567C34AC7E5}"/>
+              <a:t>parse(“y/1 s/1 c/MA1521”)</a:t>
+            </a:r>
+          </a:p>
+        </p:txBody>
+      </p:sp>
+      <p:sp>
+        <p:nvSpPr>
+          <p:cNvPr id="152" name="TextBox 151">
+            <a:extLst>
+              <a:ext uri="{FF2B5EF4-FFF2-40B4-BE49-F238E27FC236}">
+                <a16:creationId xmlns:a16="http://schemas.microsoft.com/office/drawing/2014/main" id="{FB5CC54D-44D7-497C-B072-D5D08F6308AC}"/>
               </a:ext>
             </a:extLst>
           </p:cNvPr>
@@ -4317,8 +4914,8 @@
         </p:nvSpPr>
         <p:spPr>
           <a:xfrm>
-            <a:off x="298192" y="5776380"/>
-            <a:ext cx="604722" cy="215444"/>
+            <a:off x="8075348" y="4201335"/>
+            <a:ext cx="1238921" cy="212959"/>
           </a:xfrm>
           <a:prstGeom prst="rect">
             <a:avLst/>
@@ -4342,111 +4939,16 @@
             </a:lvl1pPr>
           </a:lstStyle>
           <a:p>
-            <a:r>
-              <a:rPr lang="en-US" dirty="0"/>
-              <a:t>result</a:t>
-            </a:r>
-          </a:p>
-        </p:txBody>
-      </p:sp>
-      <p:sp>
-        <p:nvSpPr>
-          <p:cNvPr id="132" name="TextBox 131">
-            <a:extLst>
-              <a:ext uri="{FF2B5EF4-FFF2-40B4-BE49-F238E27FC236}">
-                <a16:creationId xmlns:a16="http://schemas.microsoft.com/office/drawing/2014/main" id="{E0242379-14DF-48F5-BD50-93AA2351080E}"/>
-              </a:ext>
-            </a:extLst>
-          </p:cNvPr>
-          <p:cNvSpPr txBox="1"/>
-          <p:nvPr/>
-        </p:nvSpPr>
-        <p:spPr>
-          <a:xfrm>
-            <a:off x="-3006615" y="5857525"/>
-            <a:ext cx="741768" cy="215444"/>
-          </a:xfrm>
-          <a:prstGeom prst="rect">
-            <a:avLst/>
-          </a:prstGeom>
-          <a:noFill/>
-        </p:spPr>
-        <p:txBody>
-          <a:bodyPr wrap="square" lIns="0" tIns="0" rIns="0" bIns="0" rtlCol="0">
-            <a:spAutoFit/>
-          </a:bodyPr>
-          <a:lstStyle>
-            <a:defPPr>
-              <a:defRPr lang="en-US"/>
-            </a:defPPr>
-            <a:lvl1pPr algn="r">
-              <a:defRPr sz="1400">
-                <a:solidFill>
-                  <a:srgbClr val="0070C0"/>
-                </a:solidFill>
-              </a:defRPr>
-            </a:lvl1pPr>
-          </a:lstStyle>
-          <a:p>
-            <a:r>
-              <a:rPr lang="en-US" dirty="0"/>
-              <a:t>result</a:t>
-            </a:r>
-          </a:p>
-        </p:txBody>
-      </p:sp>
-      <p:sp>
-        <p:nvSpPr>
-          <p:cNvPr id="133" name="TextBox 132">
-            <a:extLst>
-              <a:ext uri="{FF2B5EF4-FFF2-40B4-BE49-F238E27FC236}">
-                <a16:creationId xmlns:a16="http://schemas.microsoft.com/office/drawing/2014/main" id="{ACD8F5A8-6114-46AB-BEB6-6B2EE4CDCB4E}"/>
-              </a:ext>
-            </a:extLst>
-          </p:cNvPr>
-          <p:cNvSpPr txBox="1"/>
-          <p:nvPr/>
-        </p:nvSpPr>
-        <p:spPr>
-          <a:xfrm>
-            <a:off x="-539052" y="4031607"/>
-            <a:ext cx="214493" cy="215444"/>
-          </a:xfrm>
-          <a:prstGeom prst="rect">
-            <a:avLst/>
-          </a:prstGeom>
-          <a:noFill/>
-        </p:spPr>
-        <p:txBody>
-          <a:bodyPr wrap="square" lIns="0" tIns="0" rIns="0" bIns="0" rtlCol="0">
-            <a:spAutoFit/>
-          </a:bodyPr>
-          <a:lstStyle>
-            <a:defPPr>
-              <a:defRPr lang="en-US"/>
-            </a:defPPr>
-            <a:lvl1pPr algn="r">
-              <a:defRPr sz="1400">
-                <a:solidFill>
-                  <a:srgbClr val="0070C0"/>
-                </a:solidFill>
-              </a:defRPr>
-            </a:lvl1pPr>
-          </a:lstStyle>
-          <a:p>
-            <a:r>
-              <a:rPr lang="en-US" dirty="0"/>
-              <a:t>a</a:t>
-            </a:r>
-          </a:p>
-        </p:txBody>
-      </p:sp>
-      <p:sp>
-        <p:nvSpPr>
-          <p:cNvPr id="134" name="Rectangle 62">
-            <a:extLst>
-              <a:ext uri="{FF2B5EF4-FFF2-40B4-BE49-F238E27FC236}">
-                <a16:creationId xmlns:a16="http://schemas.microsoft.com/office/drawing/2014/main" id="{1ABC32DA-C6BB-4BAC-A912-1641CF12676D}"/>
+            <a:endParaRPr lang="en-US" dirty="0"/>
+          </a:p>
+        </p:txBody>
+      </p:sp>
+      <p:sp>
+        <p:nvSpPr>
+          <p:cNvPr id="188" name="Rectangle 65">
+            <a:extLst>
+              <a:ext uri="{FF2B5EF4-FFF2-40B4-BE49-F238E27FC236}">
+                <a16:creationId xmlns:a16="http://schemas.microsoft.com/office/drawing/2014/main" id="{FDB46647-BB61-4DF3-A7E4-3C1D9D5F52C0}"/>
               </a:ext>
             </a:extLst>
           </p:cNvPr>
@@ -4455,1031 +4957,8 @@
         </p:nvSpPr>
         <p:spPr>
           <a:xfrm>
-            <a:off x="2578263" y="3056576"/>
-            <a:ext cx="1064598" cy="456214"/>
-          </a:xfrm>
-          <a:prstGeom prst="rect">
-            <a:avLst/>
-          </a:prstGeom>
-          <a:solidFill>
-            <a:srgbClr val="0070C0"/>
-          </a:solidFill>
-          <a:ln w="19050">
-            <a:solidFill>
-              <a:srgbClr val="0070C0"/>
-            </a:solidFill>
-          </a:ln>
-          <a:effectLst/>
-        </p:spPr>
-        <p:style>
-          <a:lnRef idx="1">
-            <a:schemeClr val="accent2"/>
-          </a:lnRef>
-          <a:fillRef idx="2">
-            <a:schemeClr val="accent2"/>
-          </a:fillRef>
-          <a:effectRef idx="1">
-            <a:schemeClr val="accent2"/>
-          </a:effectRef>
-          <a:fontRef idx="minor">
-            <a:schemeClr val="dk1"/>
-          </a:fontRef>
-        </p:style>
-        <p:txBody>
-          <a:bodyPr rtlCol="0" anchor="ctr"/>
-          <a:lstStyle/>
-          <a:p>
-            <a:pPr algn="ctr"/>
-            <a:r>
-              <a:rPr lang="en-US" sz="1600" dirty="0">
-                <a:solidFill>
-                  <a:schemeClr val="bg1"/>
-                </a:solidFill>
-              </a:rPr>
-              <a:t>a:Add</a:t>
-            </a:r>
-            <a:br>
-              <a:rPr lang="en-US" sz="1600" dirty="0">
-                <a:solidFill>
-                  <a:schemeClr val="bg1"/>
-                </a:solidFill>
-              </a:rPr>
-            </a:br>
-            <a:r>
-              <a:rPr lang="en-US" sz="1600" dirty="0">
-                <a:solidFill>
-                  <a:schemeClr val="bg1"/>
-                </a:solidFill>
-              </a:rPr>
-              <a:t>Command</a:t>
-            </a:r>
-            <a:endParaRPr lang="en-SG" sz="1600" dirty="0">
-              <a:solidFill>
-                <a:schemeClr val="bg1"/>
-              </a:solidFill>
-            </a:endParaRPr>
-          </a:p>
-        </p:txBody>
-      </p:sp>
-      <p:cxnSp>
-        <p:nvCxnSpPr>
-          <p:cNvPr id="135" name="Straight Arrow Connector 134">
-            <a:extLst>
-              <a:ext uri="{FF2B5EF4-FFF2-40B4-BE49-F238E27FC236}">
-                <a16:creationId xmlns:a16="http://schemas.microsoft.com/office/drawing/2014/main" id="{5B6AED09-45E1-44E6-A1C7-9080BE887412}"/>
-              </a:ext>
-            </a:extLst>
-          </p:cNvPr>
-          <p:cNvCxnSpPr>
-            <a:cxnSpLocks/>
-          </p:cNvCxnSpPr>
-          <p:nvPr/>
-        </p:nvCxnSpPr>
-        <p:spPr>
-          <a:xfrm>
-            <a:off x="-1609582" y="4644211"/>
-            <a:ext cx="4677750" cy="15926"/>
-          </a:xfrm>
-          <a:prstGeom prst="straightConnector1">
-            <a:avLst/>
-          </a:prstGeom>
-          <a:ln w="19050">
-            <a:solidFill>
-              <a:srgbClr val="0070C0"/>
-            </a:solidFill>
-            <a:tailEnd type="arrow"/>
-          </a:ln>
-        </p:spPr>
-        <p:style>
-          <a:lnRef idx="1">
-            <a:schemeClr val="accent1"/>
-          </a:lnRef>
-          <a:fillRef idx="0">
-            <a:schemeClr val="accent1"/>
-          </a:fillRef>
-          <a:effectRef idx="0">
-            <a:schemeClr val="accent1"/>
-          </a:effectRef>
-          <a:fontRef idx="minor">
-            <a:schemeClr val="tx1"/>
-          </a:fontRef>
-        </p:style>
-      </p:cxnSp>
-      <p:cxnSp>
-        <p:nvCxnSpPr>
-          <p:cNvPr id="136" name="Straight Arrow Connector 135">
-            <a:extLst>
-              <a:ext uri="{FF2B5EF4-FFF2-40B4-BE49-F238E27FC236}">
-                <a16:creationId xmlns:a16="http://schemas.microsoft.com/office/drawing/2014/main" id="{4F37C6BB-44FE-48E4-B5BA-5DFD70067690}"/>
-              </a:ext>
-            </a:extLst>
-          </p:cNvPr>
-          <p:cNvCxnSpPr>
-            <a:cxnSpLocks/>
-          </p:cNvCxnSpPr>
-          <p:nvPr/>
-        </p:nvCxnSpPr>
-        <p:spPr>
-          <a:xfrm>
-            <a:off x="-1512205" y="2477731"/>
-            <a:ext cx="1977650" cy="14658"/>
-          </a:xfrm>
-          <a:prstGeom prst="straightConnector1">
-            <a:avLst/>
-          </a:prstGeom>
-          <a:ln w="19050">
-            <a:solidFill>
-              <a:srgbClr val="0070C0"/>
-            </a:solidFill>
-            <a:tailEnd type="arrow"/>
-          </a:ln>
-        </p:spPr>
-        <p:style>
-          <a:lnRef idx="1">
-            <a:schemeClr val="accent1"/>
-          </a:lnRef>
-          <a:fillRef idx="0">
-            <a:schemeClr val="accent1"/>
-          </a:fillRef>
-          <a:effectRef idx="0">
-            <a:schemeClr val="accent1"/>
-          </a:effectRef>
-          <a:fontRef idx="minor">
-            <a:schemeClr val="tx1"/>
-          </a:fontRef>
-        </p:style>
-      </p:cxnSp>
-      <p:cxnSp>
-        <p:nvCxnSpPr>
-          <p:cNvPr id="137" name="Straight Arrow Connector 136">
-            <a:extLst>
-              <a:ext uri="{FF2B5EF4-FFF2-40B4-BE49-F238E27FC236}">
-                <a16:creationId xmlns:a16="http://schemas.microsoft.com/office/drawing/2014/main" id="{EB66477F-1112-42BB-B7F2-57B0BED347A0}"/>
-              </a:ext>
-            </a:extLst>
-          </p:cNvPr>
-          <p:cNvCxnSpPr>
-            <a:cxnSpLocks/>
-            <a:endCxn id="129" idx="2"/>
-          </p:cNvCxnSpPr>
-          <p:nvPr/>
-        </p:nvCxnSpPr>
-        <p:spPr>
-          <a:xfrm>
-            <a:off x="-1519545" y="5982786"/>
-            <a:ext cx="4687739" cy="26960"/>
-          </a:xfrm>
-          <a:prstGeom prst="straightConnector1">
-            <a:avLst/>
-          </a:prstGeom>
-          <a:ln w="19050">
-            <a:solidFill>
-              <a:srgbClr val="0070C0"/>
-            </a:solidFill>
-            <a:prstDash val="sysDash"/>
-            <a:headEnd type="arrow" w="med" len="med"/>
-            <a:tailEnd type="none" w="med" len="med"/>
-          </a:ln>
-        </p:spPr>
-        <p:style>
-          <a:lnRef idx="1">
-            <a:schemeClr val="accent1"/>
-          </a:lnRef>
-          <a:fillRef idx="0">
-            <a:schemeClr val="accent1"/>
-          </a:fillRef>
-          <a:effectRef idx="0">
-            <a:schemeClr val="accent1"/>
-          </a:effectRef>
-          <a:fontRef idx="minor">
-            <a:schemeClr val="tx1"/>
-          </a:fontRef>
-        </p:style>
-      </p:cxnSp>
-      <p:sp>
-        <p:nvSpPr>
-          <p:cNvPr id="138" name="Rectangle 62">
-            <a:extLst>
-              <a:ext uri="{FF2B5EF4-FFF2-40B4-BE49-F238E27FC236}">
-                <a16:creationId xmlns:a16="http://schemas.microsoft.com/office/drawing/2014/main" id="{EB146C36-3369-4DF9-A27E-789B95FC6813}"/>
-              </a:ext>
-            </a:extLst>
-          </p:cNvPr>
-          <p:cNvSpPr/>
-          <p:nvPr/>
-        </p:nvSpPr>
-        <p:spPr>
-          <a:xfrm>
-            <a:off x="1145570" y="2263331"/>
-            <a:ext cx="1624719" cy="427051"/>
-          </a:xfrm>
-          <a:prstGeom prst="rect">
-            <a:avLst/>
-          </a:prstGeom>
-          <a:solidFill>
-            <a:srgbClr val="0070C0"/>
-          </a:solidFill>
-          <a:ln w="19050">
-            <a:solidFill>
-              <a:srgbClr val="0070C0"/>
-            </a:solidFill>
-          </a:ln>
-          <a:effectLst/>
-        </p:spPr>
-        <p:style>
-          <a:lnRef idx="1">
-            <a:schemeClr val="accent2"/>
-          </a:lnRef>
-          <a:fillRef idx="2">
-            <a:schemeClr val="accent2"/>
-          </a:fillRef>
-          <a:effectRef idx="1">
-            <a:schemeClr val="accent2"/>
-          </a:effectRef>
-          <a:fontRef idx="minor">
-            <a:schemeClr val="dk1"/>
-          </a:fontRef>
-        </p:style>
-        <p:txBody>
-          <a:bodyPr rtlCol="0" anchor="ctr"/>
-          <a:lstStyle/>
-          <a:p>
-            <a:pPr algn="ctr"/>
-            <a:r>
-              <a:rPr lang="en-US" sz="1600" dirty="0">
-                <a:solidFill>
-                  <a:schemeClr val="bg1"/>
-                </a:solidFill>
-              </a:rPr>
-              <a:t>:</a:t>
-            </a:r>
-            <a:r>
-              <a:rPr lang="en-US" sz="1600" dirty="0" err="1">
-                <a:solidFill>
-                  <a:schemeClr val="bg1"/>
-                </a:solidFill>
-              </a:rPr>
-              <a:t>AddCommand</a:t>
-            </a:r>
-            <a:endParaRPr lang="en-US" sz="1600" dirty="0">
-              <a:solidFill>
-                <a:schemeClr val="bg1"/>
-              </a:solidFill>
-            </a:endParaRPr>
-          </a:p>
-          <a:p>
-            <a:pPr algn="ctr"/>
-            <a:r>
-              <a:rPr lang="en-US" sz="1600" dirty="0">
-                <a:solidFill>
-                  <a:schemeClr val="bg1"/>
-                </a:solidFill>
-              </a:rPr>
-              <a:t>Parser</a:t>
-            </a:r>
-            <a:endParaRPr lang="en-SG" sz="1600" dirty="0">
-              <a:solidFill>
-                <a:schemeClr val="bg1"/>
-              </a:solidFill>
-            </a:endParaRPr>
-          </a:p>
-        </p:txBody>
-      </p:sp>
-      <p:sp>
-        <p:nvSpPr>
-          <p:cNvPr id="139" name="Rectangle 138">
-            <a:extLst>
-              <a:ext uri="{FF2B5EF4-FFF2-40B4-BE49-F238E27FC236}">
-                <a16:creationId xmlns:a16="http://schemas.microsoft.com/office/drawing/2014/main" id="{31ACF7E4-D1AA-4858-83F4-CFF87883D0E4}"/>
-              </a:ext>
-            </a:extLst>
-          </p:cNvPr>
-          <p:cNvSpPr/>
-          <p:nvPr/>
-        </p:nvSpPr>
-        <p:spPr>
-          <a:xfrm>
-            <a:off x="2008515" y="2709179"/>
-            <a:ext cx="200378" cy="121744"/>
-          </a:xfrm>
-          <a:prstGeom prst="rect">
-            <a:avLst/>
-          </a:prstGeom>
-          <a:solidFill>
-            <a:srgbClr val="0070C0"/>
-          </a:solidFill>
-          <a:ln>
-            <a:solidFill>
-              <a:srgbClr val="0070C0"/>
-            </a:solidFill>
-          </a:ln>
-          <a:effectLst/>
-        </p:spPr>
-        <p:style>
-          <a:lnRef idx="1">
-            <a:schemeClr val="accent3"/>
-          </a:lnRef>
-          <a:fillRef idx="2">
-            <a:schemeClr val="accent3"/>
-          </a:fillRef>
-          <a:effectRef idx="1">
-            <a:schemeClr val="accent3"/>
-          </a:effectRef>
-          <a:fontRef idx="minor">
-            <a:schemeClr val="dk1"/>
-          </a:fontRef>
-        </p:style>
-        <p:txBody>
-          <a:bodyPr rtlCol="0" anchor="ctr"/>
-          <a:lstStyle/>
-          <a:p>
-            <a:pPr algn="ctr"/>
-            <a:endParaRPr lang="en-SG" sz="1400"/>
-          </a:p>
-        </p:txBody>
-      </p:sp>
-      <p:cxnSp>
-        <p:nvCxnSpPr>
-          <p:cNvPr id="140" name="Straight Arrow Connector 139">
-            <a:extLst>
-              <a:ext uri="{FF2B5EF4-FFF2-40B4-BE49-F238E27FC236}">
-                <a16:creationId xmlns:a16="http://schemas.microsoft.com/office/drawing/2014/main" id="{7756FB46-0A64-494B-BE17-52F664D4E229}"/>
-              </a:ext>
-            </a:extLst>
-          </p:cNvPr>
-          <p:cNvCxnSpPr>
-            <a:cxnSpLocks/>
-          </p:cNvCxnSpPr>
-          <p:nvPr/>
-        </p:nvCxnSpPr>
-        <p:spPr>
-          <a:xfrm>
-            <a:off x="619734" y="2492389"/>
-            <a:ext cx="510923" cy="32"/>
-          </a:xfrm>
-          <a:prstGeom prst="straightConnector1">
-            <a:avLst/>
-          </a:prstGeom>
-          <a:ln w="19050">
-            <a:solidFill>
-              <a:srgbClr val="0070C0"/>
-            </a:solidFill>
-            <a:tailEnd type="arrow"/>
-          </a:ln>
-        </p:spPr>
-        <p:style>
-          <a:lnRef idx="1">
-            <a:schemeClr val="accent1"/>
-          </a:lnRef>
-          <a:fillRef idx="0">
-            <a:schemeClr val="accent1"/>
-          </a:fillRef>
-          <a:effectRef idx="0">
-            <a:schemeClr val="accent1"/>
-          </a:effectRef>
-          <a:fontRef idx="minor">
-            <a:schemeClr val="tx1"/>
-          </a:fontRef>
-        </p:style>
-      </p:cxnSp>
-      <p:cxnSp>
-        <p:nvCxnSpPr>
-          <p:cNvPr id="141" name="Straight Arrow Connector 140">
-            <a:extLst>
-              <a:ext uri="{FF2B5EF4-FFF2-40B4-BE49-F238E27FC236}">
-                <a16:creationId xmlns:a16="http://schemas.microsoft.com/office/drawing/2014/main" id="{83BB86EC-B24D-4549-876A-3562D3605AA1}"/>
-              </a:ext>
-            </a:extLst>
-          </p:cNvPr>
-          <p:cNvCxnSpPr>
-            <a:cxnSpLocks/>
-          </p:cNvCxnSpPr>
-          <p:nvPr/>
-        </p:nvCxnSpPr>
-        <p:spPr>
-          <a:xfrm flipV="1">
-            <a:off x="616816" y="2825958"/>
-            <a:ext cx="1375508" cy="14398"/>
-          </a:xfrm>
-          <a:prstGeom prst="straightConnector1">
-            <a:avLst/>
-          </a:prstGeom>
-          <a:ln w="19050">
-            <a:solidFill>
-              <a:srgbClr val="0070C0"/>
-            </a:solidFill>
-            <a:prstDash val="sysDash"/>
-            <a:headEnd type="arrow" w="med" len="med"/>
-            <a:tailEnd type="none" w="med" len="med"/>
-          </a:ln>
-        </p:spPr>
-        <p:style>
-          <a:lnRef idx="1">
-            <a:schemeClr val="accent1"/>
-          </a:lnRef>
-          <a:fillRef idx="0">
-            <a:schemeClr val="accent1"/>
-          </a:fillRef>
-          <a:effectRef idx="0">
-            <a:schemeClr val="accent1"/>
-          </a:effectRef>
-          <a:fontRef idx="minor">
-            <a:schemeClr val="tx1"/>
-          </a:fontRef>
-        </p:style>
-      </p:cxnSp>
-      <p:cxnSp>
-        <p:nvCxnSpPr>
-          <p:cNvPr id="142" name="Straight Connector 141">
-            <a:extLst>
-              <a:ext uri="{FF2B5EF4-FFF2-40B4-BE49-F238E27FC236}">
-                <a16:creationId xmlns:a16="http://schemas.microsoft.com/office/drawing/2014/main" id="{4FC4DF6D-B40E-46F8-AB61-C4D5B6EF6203}"/>
-              </a:ext>
-            </a:extLst>
-          </p:cNvPr>
-          <p:cNvCxnSpPr>
-            <a:cxnSpLocks/>
-            <a:stCxn id="139" idx="2"/>
-          </p:cNvCxnSpPr>
-          <p:nvPr/>
-        </p:nvCxnSpPr>
-        <p:spPr>
-          <a:xfrm flipH="1">
-            <a:off x="2097564" y="2830923"/>
-            <a:ext cx="11140" cy="1733460"/>
-          </a:xfrm>
-          <a:prstGeom prst="line">
-            <a:avLst/>
-          </a:prstGeom>
-          <a:ln w="19050">
-            <a:solidFill>
-              <a:srgbClr val="0070C0"/>
-            </a:solidFill>
-            <a:prstDash val="sysDash"/>
-          </a:ln>
-          <a:effectLst/>
-        </p:spPr>
-        <p:style>
-          <a:lnRef idx="1">
-            <a:schemeClr val="accent1"/>
-          </a:lnRef>
-          <a:fillRef idx="2">
-            <a:schemeClr val="accent1"/>
-          </a:fillRef>
-          <a:effectRef idx="1">
-            <a:schemeClr val="accent1"/>
-          </a:effectRef>
-          <a:fontRef idx="minor">
-            <a:schemeClr val="dk1"/>
-          </a:fontRef>
-        </p:style>
-      </p:cxnSp>
-      <p:sp>
-        <p:nvSpPr>
-          <p:cNvPr id="143" name="Rectangle 142">
-            <a:extLst>
-              <a:ext uri="{FF2B5EF4-FFF2-40B4-BE49-F238E27FC236}">
-                <a16:creationId xmlns:a16="http://schemas.microsoft.com/office/drawing/2014/main" id="{46A27291-B3A0-4D67-A52C-D345373EA45C}"/>
-              </a:ext>
-            </a:extLst>
-          </p:cNvPr>
-          <p:cNvSpPr/>
-          <p:nvPr/>
-        </p:nvSpPr>
-        <p:spPr>
-          <a:xfrm>
-            <a:off x="2017836" y="3049241"/>
-            <a:ext cx="157039" cy="859820"/>
-          </a:xfrm>
-          <a:prstGeom prst="rect">
-            <a:avLst/>
-          </a:prstGeom>
-          <a:solidFill>
-            <a:srgbClr val="0070C0"/>
-          </a:solidFill>
-          <a:ln>
-            <a:solidFill>
-              <a:srgbClr val="0070C0"/>
-            </a:solidFill>
-          </a:ln>
-          <a:effectLst/>
-        </p:spPr>
-        <p:style>
-          <a:lnRef idx="1">
-            <a:schemeClr val="accent3"/>
-          </a:lnRef>
-          <a:fillRef idx="2">
-            <a:schemeClr val="accent3"/>
-          </a:fillRef>
-          <a:effectRef idx="1">
-            <a:schemeClr val="accent3"/>
-          </a:effectRef>
-          <a:fontRef idx="minor">
-            <a:schemeClr val="dk1"/>
-          </a:fontRef>
-        </p:style>
-        <p:txBody>
-          <a:bodyPr rtlCol="0" anchor="ctr"/>
-          <a:lstStyle/>
-          <a:p>
-            <a:pPr algn="ctr"/>
-            <a:endParaRPr lang="en-SG" sz="1400" dirty="0"/>
-          </a:p>
-        </p:txBody>
-      </p:sp>
-      <p:cxnSp>
-        <p:nvCxnSpPr>
-          <p:cNvPr id="144" name="Straight Arrow Connector 143">
-            <a:extLst>
-              <a:ext uri="{FF2B5EF4-FFF2-40B4-BE49-F238E27FC236}">
-                <a16:creationId xmlns:a16="http://schemas.microsoft.com/office/drawing/2014/main" id="{A95C9CFD-C229-4D87-8988-DEDF0C7A1F08}"/>
-              </a:ext>
-            </a:extLst>
-          </p:cNvPr>
-          <p:cNvCxnSpPr>
-            <a:cxnSpLocks/>
-          </p:cNvCxnSpPr>
-          <p:nvPr/>
-        </p:nvCxnSpPr>
-        <p:spPr>
-          <a:xfrm>
-            <a:off x="624513" y="3059617"/>
-            <a:ext cx="1384002" cy="2607"/>
-          </a:xfrm>
-          <a:prstGeom prst="straightConnector1">
-            <a:avLst/>
-          </a:prstGeom>
-          <a:ln w="19050">
-            <a:solidFill>
-              <a:srgbClr val="0070C0"/>
-            </a:solidFill>
-            <a:tailEnd type="arrow"/>
-          </a:ln>
-        </p:spPr>
-        <p:style>
-          <a:lnRef idx="1">
-            <a:schemeClr val="accent1"/>
-          </a:lnRef>
-          <a:fillRef idx="0">
-            <a:schemeClr val="accent1"/>
-          </a:fillRef>
-          <a:effectRef idx="0">
-            <a:schemeClr val="accent1"/>
-          </a:effectRef>
-          <a:fontRef idx="minor">
-            <a:schemeClr val="tx1"/>
-          </a:fontRef>
-        </p:style>
-      </p:cxnSp>
-      <p:cxnSp>
-        <p:nvCxnSpPr>
-          <p:cNvPr id="145" name="Straight Arrow Connector 144">
-            <a:extLst>
-              <a:ext uri="{FF2B5EF4-FFF2-40B4-BE49-F238E27FC236}">
-                <a16:creationId xmlns:a16="http://schemas.microsoft.com/office/drawing/2014/main" id="{CCC50A13-4675-4FBA-B21F-CF9704D0A89F}"/>
-              </a:ext>
-            </a:extLst>
-          </p:cNvPr>
-          <p:cNvCxnSpPr>
-            <a:cxnSpLocks/>
-          </p:cNvCxnSpPr>
-          <p:nvPr/>
-        </p:nvCxnSpPr>
-        <p:spPr>
-          <a:xfrm>
-            <a:off x="620711" y="3897816"/>
-            <a:ext cx="1371613" cy="0"/>
-          </a:xfrm>
-          <a:prstGeom prst="straightConnector1">
-            <a:avLst/>
-          </a:prstGeom>
-          <a:ln w="19050">
-            <a:solidFill>
-              <a:srgbClr val="0070C0"/>
-            </a:solidFill>
-            <a:prstDash val="sysDash"/>
-            <a:headEnd type="arrow" w="med" len="med"/>
-            <a:tailEnd type="none" w="med" len="med"/>
-          </a:ln>
-        </p:spPr>
-        <p:style>
-          <a:lnRef idx="1">
-            <a:schemeClr val="accent1"/>
-          </a:lnRef>
-          <a:fillRef idx="0">
-            <a:schemeClr val="accent1"/>
-          </a:fillRef>
-          <a:effectRef idx="0">
-            <a:schemeClr val="accent1"/>
-          </a:effectRef>
-          <a:fontRef idx="minor">
-            <a:schemeClr val="tx1"/>
-          </a:fontRef>
-        </p:style>
-      </p:cxnSp>
-      <p:sp>
-        <p:nvSpPr>
-          <p:cNvPr id="146" name="TextBox 145">
-            <a:extLst>
-              <a:ext uri="{FF2B5EF4-FFF2-40B4-BE49-F238E27FC236}">
-                <a16:creationId xmlns:a16="http://schemas.microsoft.com/office/drawing/2014/main" id="{D3CA5C27-6475-41BF-B5C8-714115F05346}"/>
-              </a:ext>
-            </a:extLst>
-          </p:cNvPr>
-          <p:cNvSpPr txBox="1"/>
-          <p:nvPr/>
-        </p:nvSpPr>
-        <p:spPr>
-          <a:xfrm>
-            <a:off x="641421" y="3132183"/>
-            <a:ext cx="1302992" cy="430887"/>
-          </a:xfrm>
-          <a:prstGeom prst="rect">
-            <a:avLst/>
-          </a:prstGeom>
-          <a:noFill/>
-        </p:spPr>
-        <p:txBody>
-          <a:bodyPr wrap="square" lIns="0" tIns="0" rIns="0" bIns="0" rtlCol="0">
-            <a:spAutoFit/>
-          </a:bodyPr>
-          <a:lstStyle>
-            <a:defPPr>
-              <a:defRPr lang="en-US"/>
-            </a:defPPr>
-            <a:lvl1pPr algn="r">
-              <a:defRPr sz="1400">
-                <a:solidFill>
-                  <a:srgbClr val="0070C0"/>
-                </a:solidFill>
-              </a:defRPr>
-            </a:lvl1pPr>
-          </a:lstStyle>
-          <a:p>
-            <a:pPr algn="ctr"/>
-            <a:r>
-              <a:rPr lang="en-US" dirty="0"/>
-              <a:t>parse(“y/1 s/1 c/MA1521”)</a:t>
-            </a:r>
-          </a:p>
-        </p:txBody>
-      </p:sp>
-      <p:sp>
-        <p:nvSpPr>
-          <p:cNvPr id="148" name="Rectangle 147">
-            <a:extLst>
-              <a:ext uri="{FF2B5EF4-FFF2-40B4-BE49-F238E27FC236}">
-                <a16:creationId xmlns:a16="http://schemas.microsoft.com/office/drawing/2014/main" id="{790BA508-2556-45EF-89FE-E0230A766AF1}"/>
-              </a:ext>
-            </a:extLst>
-          </p:cNvPr>
-          <p:cNvSpPr/>
-          <p:nvPr/>
-        </p:nvSpPr>
-        <p:spPr>
-          <a:xfrm>
-            <a:off x="9306210" y="1778666"/>
-            <a:ext cx="1489779" cy="335753"/>
-          </a:xfrm>
-          <a:prstGeom prst="rect">
-            <a:avLst/>
-          </a:prstGeom>
-          <a:solidFill>
-            <a:schemeClr val="accent2"/>
-          </a:solidFill>
-          <a:ln>
-            <a:solidFill>
-              <a:schemeClr val="accent2"/>
-            </a:solidFill>
-          </a:ln>
-        </p:spPr>
-        <p:style>
-          <a:lnRef idx="2">
-            <a:schemeClr val="accent1">
-              <a:shade val="50000"/>
-            </a:schemeClr>
-          </a:lnRef>
-          <a:fillRef idx="1">
-            <a:schemeClr val="accent1"/>
-          </a:fillRef>
-          <a:effectRef idx="0">
-            <a:schemeClr val="accent1"/>
-          </a:effectRef>
-          <a:fontRef idx="minor">
-            <a:schemeClr val="lt1"/>
-          </a:fontRef>
-        </p:style>
-        <p:txBody>
-          <a:bodyPr rtlCol="0" anchor="ctr"/>
-          <a:lstStyle/>
-          <a:p>
-            <a:pPr algn="ctr"/>
-            <a:r>
-              <a:rPr lang="en-US" dirty="0"/>
-              <a:t>:</a:t>
-            </a:r>
-            <a:r>
-              <a:rPr lang="en-US" dirty="0" err="1"/>
-              <a:t>EventsCenter</a:t>
-            </a:r>
-            <a:endParaRPr lang="en-US" dirty="0"/>
-          </a:p>
-        </p:txBody>
-      </p:sp>
-      <p:sp>
-        <p:nvSpPr>
-          <p:cNvPr id="150" name="TextBox 149">
-            <a:extLst>
-              <a:ext uri="{FF2B5EF4-FFF2-40B4-BE49-F238E27FC236}">
-                <a16:creationId xmlns:a16="http://schemas.microsoft.com/office/drawing/2014/main" id="{F9E51A45-C2D7-49D5-9662-E550E75DDF8E}"/>
-              </a:ext>
-            </a:extLst>
-          </p:cNvPr>
-          <p:cNvSpPr txBox="1"/>
-          <p:nvPr/>
-        </p:nvSpPr>
-        <p:spPr>
-          <a:xfrm>
-            <a:off x="10263831" y="5683248"/>
-            <a:ext cx="1683586" cy="215444"/>
-          </a:xfrm>
-          <a:prstGeom prst="rect">
-            <a:avLst/>
-          </a:prstGeom>
-          <a:noFill/>
-        </p:spPr>
-        <p:txBody>
-          <a:bodyPr wrap="square" lIns="0" tIns="0" rIns="0" bIns="0" rtlCol="0">
-            <a:spAutoFit/>
-          </a:bodyPr>
-          <a:lstStyle>
-            <a:defPPr>
-              <a:defRPr lang="en-US"/>
-            </a:defPPr>
-            <a:lvl1pPr algn="r">
-              <a:defRPr sz="1400">
-                <a:solidFill>
-                  <a:srgbClr val="0070C0"/>
-                </a:solidFill>
-              </a:defRPr>
-            </a:lvl1pPr>
-          </a:lstStyle>
-          <a:p>
-            <a:pPr algn="ctr"/>
-            <a:r>
-              <a:rPr lang="en-US" dirty="0">
-                <a:solidFill>
-                  <a:schemeClr val="accent2"/>
-                </a:solidFill>
-              </a:rPr>
-              <a:t>post(</a:t>
-            </a:r>
-            <a:r>
-              <a:rPr lang="en-US" dirty="0" err="1">
-                <a:solidFill>
-                  <a:schemeClr val="accent2"/>
-                </a:solidFill>
-              </a:rPr>
-              <a:t>AddModuleEvent</a:t>
-            </a:r>
-            <a:r>
-              <a:rPr lang="en-US" dirty="0">
-                <a:solidFill>
-                  <a:schemeClr val="accent2"/>
-                </a:solidFill>
-              </a:rPr>
-              <a:t>)</a:t>
-            </a:r>
-          </a:p>
-        </p:txBody>
-      </p:sp>
-      <p:cxnSp>
-        <p:nvCxnSpPr>
-          <p:cNvPr id="151" name="Straight Arrow Connector 150">
-            <a:extLst>
-              <a:ext uri="{FF2B5EF4-FFF2-40B4-BE49-F238E27FC236}">
-                <a16:creationId xmlns:a16="http://schemas.microsoft.com/office/drawing/2014/main" id="{CEB26131-1141-4FF7-B6B9-1479C90AD351}"/>
-              </a:ext>
-            </a:extLst>
-          </p:cNvPr>
-          <p:cNvCxnSpPr>
-            <a:cxnSpLocks/>
-          </p:cNvCxnSpPr>
-          <p:nvPr/>
-        </p:nvCxnSpPr>
-        <p:spPr>
-          <a:xfrm flipV="1">
-            <a:off x="10067365" y="5889119"/>
-            <a:ext cx="2153548" cy="17702"/>
-          </a:xfrm>
-          <a:prstGeom prst="straightConnector1">
-            <a:avLst/>
-          </a:prstGeom>
-          <a:ln w="19050">
-            <a:solidFill>
-              <a:schemeClr val="accent2"/>
-            </a:solidFill>
-            <a:tailEnd type="arrow"/>
-          </a:ln>
-        </p:spPr>
-        <p:style>
-          <a:lnRef idx="1">
-            <a:schemeClr val="accent1"/>
-          </a:lnRef>
-          <a:fillRef idx="0">
-            <a:schemeClr val="accent1"/>
-          </a:fillRef>
-          <a:effectRef idx="0">
-            <a:schemeClr val="accent1"/>
-          </a:effectRef>
-          <a:fontRef idx="minor">
-            <a:schemeClr val="tx1"/>
-          </a:fontRef>
-        </p:style>
-      </p:cxnSp>
-      <p:sp>
-        <p:nvSpPr>
-          <p:cNvPr id="152" name="TextBox 151">
-            <a:extLst>
-              <a:ext uri="{FF2B5EF4-FFF2-40B4-BE49-F238E27FC236}">
-                <a16:creationId xmlns:a16="http://schemas.microsoft.com/office/drawing/2014/main" id="{FB5CC54D-44D7-497C-B072-D5D08F6308AC}"/>
-              </a:ext>
-            </a:extLst>
-          </p:cNvPr>
-          <p:cNvSpPr txBox="1"/>
-          <p:nvPr/>
-        </p:nvSpPr>
-        <p:spPr>
-          <a:xfrm>
-            <a:off x="3320468" y="4626498"/>
-            <a:ext cx="1238921" cy="212959"/>
-          </a:xfrm>
-          <a:prstGeom prst="rect">
-            <a:avLst/>
-          </a:prstGeom>
-          <a:noFill/>
-        </p:spPr>
-        <p:txBody>
-          <a:bodyPr wrap="square" lIns="0" tIns="0" rIns="0" bIns="0" rtlCol="0">
-            <a:spAutoFit/>
-          </a:bodyPr>
-          <a:lstStyle>
-            <a:defPPr>
-              <a:defRPr lang="en-US"/>
-            </a:defPPr>
-            <a:lvl1pPr algn="r">
-              <a:defRPr sz="1400">
-                <a:solidFill>
-                  <a:srgbClr val="0070C0"/>
-                </a:solidFill>
-              </a:defRPr>
-            </a:lvl1pPr>
-          </a:lstStyle>
-          <a:p>
-            <a:endParaRPr lang="en-US" dirty="0"/>
-          </a:p>
-        </p:txBody>
-      </p:sp>
-      <p:sp>
-        <p:nvSpPr>
-          <p:cNvPr id="153" name="Rectangle 152">
-            <a:extLst>
-              <a:ext uri="{FF2B5EF4-FFF2-40B4-BE49-F238E27FC236}">
-                <a16:creationId xmlns:a16="http://schemas.microsoft.com/office/drawing/2014/main" id="{D983D61F-FF4B-4F65-8FF2-5C43C7943851}"/>
-              </a:ext>
-            </a:extLst>
-          </p:cNvPr>
-          <p:cNvSpPr/>
-          <p:nvPr/>
-        </p:nvSpPr>
-        <p:spPr>
-          <a:xfrm>
-            <a:off x="11473543" y="1778666"/>
-            <a:ext cx="1686016" cy="335753"/>
-          </a:xfrm>
-          <a:prstGeom prst="rect">
-            <a:avLst/>
-          </a:prstGeom>
-          <a:solidFill>
-            <a:schemeClr val="accent6"/>
-          </a:solidFill>
-          <a:ln>
-            <a:solidFill>
-              <a:schemeClr val="accent6"/>
-            </a:solidFill>
-          </a:ln>
-        </p:spPr>
-        <p:style>
-          <a:lnRef idx="2">
-            <a:schemeClr val="accent1">
-              <a:shade val="50000"/>
-            </a:schemeClr>
-          </a:lnRef>
-          <a:fillRef idx="1">
-            <a:schemeClr val="accent1"/>
-          </a:fillRef>
-          <a:effectRef idx="0">
-            <a:schemeClr val="accent1"/>
-          </a:effectRef>
-          <a:fontRef idx="minor">
-            <a:schemeClr val="lt1"/>
-          </a:fontRef>
-        </p:style>
-        <p:txBody>
-          <a:bodyPr rtlCol="0" anchor="ctr"/>
-          <a:lstStyle/>
-          <a:p>
-            <a:pPr algn="ctr"/>
-            <a:r>
-              <a:rPr lang="en-US" dirty="0"/>
-              <a:t>:</a:t>
-            </a:r>
-            <a:r>
-              <a:rPr lang="en-US" dirty="0" err="1"/>
-              <a:t>MainWindow</a:t>
-            </a:r>
-            <a:endParaRPr lang="en-US" dirty="0"/>
-          </a:p>
-        </p:txBody>
-      </p:sp>
-      <p:sp>
-        <p:nvSpPr>
-          <p:cNvPr id="155" name="TextBox 154">
-            <a:extLst>
-              <a:ext uri="{FF2B5EF4-FFF2-40B4-BE49-F238E27FC236}">
-                <a16:creationId xmlns:a16="http://schemas.microsoft.com/office/drawing/2014/main" id="{1C252D72-C684-451E-9D5A-52B9E7CF7D1B}"/>
-              </a:ext>
-            </a:extLst>
-          </p:cNvPr>
-          <p:cNvSpPr txBox="1"/>
-          <p:nvPr/>
-        </p:nvSpPr>
-        <p:spPr>
-          <a:xfrm>
-            <a:off x="12392818" y="5779198"/>
-            <a:ext cx="2383447" cy="215444"/>
-          </a:xfrm>
-          <a:prstGeom prst="rect">
-            <a:avLst/>
-          </a:prstGeom>
-          <a:noFill/>
-          <a:ln>
-            <a:noFill/>
-          </a:ln>
-        </p:spPr>
-        <p:txBody>
-          <a:bodyPr wrap="square" lIns="0" tIns="0" rIns="0" bIns="0" rtlCol="0">
-            <a:spAutoFit/>
-          </a:bodyPr>
-          <a:lstStyle>
-            <a:defPPr>
-              <a:defRPr lang="en-US"/>
-            </a:defPPr>
-            <a:lvl1pPr algn="r">
-              <a:defRPr sz="1400">
-                <a:solidFill>
-                  <a:srgbClr val="0070C0"/>
-                </a:solidFill>
-              </a:defRPr>
-            </a:lvl1pPr>
-          </a:lstStyle>
-          <a:p>
-            <a:pPr algn="ctr"/>
-            <a:r>
-              <a:rPr lang="en-US" dirty="0" err="1">
-                <a:solidFill>
-                  <a:schemeClr val="accent6"/>
-                </a:solidFill>
-              </a:rPr>
-              <a:t>handleAddModuleEvent</a:t>
-            </a:r>
-            <a:r>
-              <a:rPr lang="en-US" dirty="0">
-                <a:solidFill>
-                  <a:schemeClr val="accent6"/>
-                </a:solidFill>
-              </a:rPr>
-              <a:t>(event)</a:t>
-            </a:r>
-          </a:p>
-        </p:txBody>
-      </p:sp>
-      <p:sp>
-        <p:nvSpPr>
-          <p:cNvPr id="188" name="Rectangle 65">
-            <a:extLst>
-              <a:ext uri="{FF2B5EF4-FFF2-40B4-BE49-F238E27FC236}">
-                <a16:creationId xmlns:a16="http://schemas.microsoft.com/office/drawing/2014/main" id="{FDB46647-BB61-4DF3-A7E4-3C1D9D5F52C0}"/>
-              </a:ext>
-            </a:extLst>
-          </p:cNvPr>
-          <p:cNvSpPr/>
-          <p:nvPr/>
-        </p:nvSpPr>
-        <p:spPr>
-          <a:xfrm>
-            <a:off x="3979690" y="1280160"/>
-            <a:ext cx="4917982" cy="4873688"/>
+            <a:off x="8734570" y="854996"/>
+            <a:ext cx="4917982" cy="5860235"/>
           </a:xfrm>
           <a:prstGeom prst="roundRect">
             <a:avLst>
@@ -5567,7 +5046,7 @@
         </p:nvSpPr>
         <p:spPr>
           <a:xfrm>
-            <a:off x="5769977" y="4468124"/>
+            <a:off x="10524857" y="4042961"/>
             <a:ext cx="1539353" cy="331558"/>
           </a:xfrm>
           <a:prstGeom prst="rect">
@@ -5670,7 +5149,7 @@
         </p:nvSpPr>
         <p:spPr>
           <a:xfrm>
-            <a:off x="6493770" y="5083085"/>
+            <a:off x="11248650" y="4657922"/>
             <a:ext cx="126483" cy="393964"/>
           </a:xfrm>
           <a:prstGeom prst="rect">
@@ -5739,7 +5218,7 @@
         </p:nvSpPr>
         <p:spPr>
           <a:xfrm>
-            <a:off x="4413962" y="4261311"/>
+            <a:off x="9168842" y="3836148"/>
             <a:ext cx="819290" cy="296717"/>
           </a:xfrm>
           <a:prstGeom prst="rect">
@@ -5827,8 +5306,8 @@
         </p:nvCxnSpPr>
         <p:spPr>
           <a:xfrm flipH="1">
-            <a:off x="4850689" y="4568978"/>
-            <a:ext cx="3853" cy="1715687"/>
+            <a:off x="9609422" y="4143815"/>
+            <a:ext cx="1" cy="2682279"/>
           </a:xfrm>
           <a:prstGeom prst="line">
             <a:avLst/>
@@ -5881,8 +5360,8 @@
         </p:nvCxnSpPr>
         <p:spPr>
           <a:xfrm>
-            <a:off x="6564027" y="4784512"/>
-            <a:ext cx="0" cy="1500153"/>
+            <a:off x="11318907" y="4359349"/>
+            <a:ext cx="0" cy="2498651"/>
           </a:xfrm>
           <a:prstGeom prst="line">
             <a:avLst/>
@@ -5935,7 +5414,7 @@
         </p:nvCxnSpPr>
         <p:spPr>
           <a:xfrm>
-            <a:off x="4911399" y="5083085"/>
+            <a:off x="9666279" y="4657922"/>
             <a:ext cx="1582371" cy="0"/>
           </a:xfrm>
           <a:prstGeom prst="straightConnector1">
@@ -5968,7 +5447,7 @@
         </p:nvCxnSpPr>
         <p:spPr>
           <a:xfrm flipV="1">
-            <a:off x="4908188" y="5468169"/>
+            <a:off x="9663068" y="5043006"/>
             <a:ext cx="1606725" cy="2"/>
           </a:xfrm>
           <a:prstGeom prst="straightConnector1">
@@ -6000,7 +5479,7 @@
         </p:nvSpPr>
         <p:spPr>
           <a:xfrm>
-            <a:off x="4511191" y="4864915"/>
+            <a:off x="9266071" y="4439752"/>
             <a:ext cx="1814121" cy="184666"/>
           </a:xfrm>
           <a:prstGeom prst="rect">
@@ -6096,7 +5575,7 @@
         </p:nvSpPr>
         <p:spPr>
           <a:xfrm>
-            <a:off x="7735615" y="4449625"/>
+            <a:off x="12490495" y="4024462"/>
             <a:ext cx="1077962" cy="296717"/>
           </a:xfrm>
           <a:prstGeom prst="rect">
@@ -6184,8 +5663,8 @@
         </p:nvCxnSpPr>
         <p:spPr>
           <a:xfrm>
-            <a:off x="8264516" y="4784512"/>
-            <a:ext cx="0" cy="1474385"/>
+            <a:off x="13019396" y="4359349"/>
+            <a:ext cx="0" cy="2498651"/>
           </a:xfrm>
           <a:prstGeom prst="line">
             <a:avLst/>
@@ -6238,7 +5717,7 @@
         </p:nvCxnSpPr>
         <p:spPr>
           <a:xfrm>
-            <a:off x="6588116" y="5158012"/>
+            <a:off x="11342996" y="4732849"/>
             <a:ext cx="1602435" cy="0"/>
           </a:xfrm>
           <a:prstGeom prst="straightConnector1">
@@ -6269,7 +5748,7 @@
         </p:nvSpPr>
         <p:spPr>
           <a:xfrm>
-            <a:off x="8190551" y="5160687"/>
+            <a:off x="12945431" y="4735524"/>
             <a:ext cx="126483" cy="229196"/>
           </a:xfrm>
           <a:prstGeom prst="rect">
@@ -6340,7 +5819,7 @@
         </p:nvCxnSpPr>
         <p:spPr>
           <a:xfrm>
-            <a:off x="6611459" y="5389883"/>
+            <a:off x="11366339" y="4964720"/>
             <a:ext cx="1591648" cy="0"/>
           </a:xfrm>
           <a:prstGeom prst="straightConnector1">
@@ -6372,7 +5851,7 @@
         </p:nvSpPr>
         <p:spPr>
           <a:xfrm>
-            <a:off x="6536418" y="4946159"/>
+            <a:off x="11291298" y="4520996"/>
             <a:ext cx="1538579" cy="184666"/>
           </a:xfrm>
           <a:prstGeom prst="rect">
@@ -6476,7 +5955,7 @@
         </p:nvCxnSpPr>
         <p:spPr>
           <a:xfrm flipV="1">
-            <a:off x="3148651" y="4864915"/>
+            <a:off x="7903531" y="4439752"/>
             <a:ext cx="1603073" cy="6244"/>
           </a:xfrm>
           <a:prstGeom prst="straightConnector1">
@@ -6518,7 +5997,7 @@
         </p:nvSpPr>
         <p:spPr>
           <a:xfrm>
-            <a:off x="2869155" y="4660424"/>
+            <a:off x="7624035" y="4235261"/>
             <a:ext cx="1814121" cy="184666"/>
           </a:xfrm>
           <a:prstGeom prst="rect">
@@ -6589,50 +6068,6 @@
           </a:p>
         </p:txBody>
       </p:sp>
-      <p:cxnSp>
-        <p:nvCxnSpPr>
-          <p:cNvPr id="147" name="Straight Arrow Connector 146">
-            <a:extLst>
-              <a:ext uri="{FF2B5EF4-FFF2-40B4-BE49-F238E27FC236}">
-                <a16:creationId xmlns:a16="http://schemas.microsoft.com/office/drawing/2014/main" id="{0AECEA8F-8DD8-401A-B83A-6F657FDBE321}"/>
-              </a:ext>
-            </a:extLst>
-          </p:cNvPr>
-          <p:cNvCxnSpPr>
-            <a:cxnSpLocks/>
-          </p:cNvCxnSpPr>
-          <p:nvPr/>
-        </p:nvCxnSpPr>
-        <p:spPr>
-          <a:xfrm>
-            <a:off x="3108935" y="5835168"/>
-            <a:ext cx="6818054" cy="6207"/>
-          </a:xfrm>
-          <a:prstGeom prst="straightConnector1">
-            <a:avLst/>
-          </a:prstGeom>
-          <a:ln w="19050">
-            <a:solidFill>
-              <a:srgbClr val="0070C0"/>
-            </a:solidFill>
-            <a:tailEnd type="arrow"/>
-          </a:ln>
-        </p:spPr>
-        <p:style>
-          <a:lnRef idx="1">
-            <a:schemeClr val="accent1"/>
-          </a:lnRef>
-          <a:fillRef idx="0">
-            <a:schemeClr val="accent1"/>
-          </a:fillRef>
-          <a:effectRef idx="0">
-            <a:schemeClr val="accent1"/>
-          </a:effectRef>
-          <a:fontRef idx="minor">
-            <a:schemeClr val="tx1"/>
-          </a:fontRef>
-        </p:style>
-      </p:cxnSp>
       <p:sp>
         <p:nvSpPr>
           <p:cNvPr id="193" name="Rectangle 192">
@@ -6647,7 +6082,7 @@
         </p:nvSpPr>
         <p:spPr>
           <a:xfrm>
-            <a:off x="4751724" y="4862703"/>
+            <a:off x="9506604" y="4437540"/>
             <a:ext cx="164412" cy="766745"/>
           </a:xfrm>
           <a:prstGeom prst="rect">
@@ -6716,7 +6151,7 @@
         </p:nvSpPr>
         <p:spPr>
           <a:xfrm>
-            <a:off x="5407780" y="5622733"/>
+            <a:off x="10676374" y="5168971"/>
             <a:ext cx="1814121" cy="184666"/>
           </a:xfrm>
           <a:prstGeom prst="rect">
@@ -6759,7 +6194,17 @@
               <a:defRPr/>
             </a:pPr>
             <a:r>
-              <a:rPr kumimoji="0" lang="en-US" sz="1200" b="0" i="0" u="none" strike="noStrike" kern="0" cap="none" spc="0" normalizeH="0" baseline="0" noProof="0" dirty="0" err="1">
+              <a:rPr lang="en-US" sz="1200" kern="0" dirty="0">
+                <a:solidFill>
+                  <a:schemeClr val="accent1">
+                    <a:lumMod val="75000"/>
+                  </a:schemeClr>
+                </a:solidFill>
+              </a:rPr>
+              <a:t>post</a:t>
+            </a:r>
+            <a:r>
+              <a:rPr kumimoji="0" lang="en-US" sz="1200" b="0" i="0" u="none" strike="noStrike" kern="0" cap="none" spc="0" normalizeH="0" baseline="0" noProof="0" dirty="0">
                 <a:ln>
                   <a:noFill/>
                 </a:ln>
@@ -6772,38 +6217,37 @@
                 <a:uLnTx/>
                 <a:uFillTx/>
               </a:rPr>
-              <a:t>AddModuleEvent</a:t>
-            </a:r>
-            <a:r>
-              <a:rPr kumimoji="0" lang="en-US" sz="1200" b="0" i="0" u="none" strike="noStrike" kern="0" cap="none" spc="0" normalizeH="0" baseline="0" noProof="0" dirty="0">
-                <a:ln>
-                  <a:noFill/>
-                </a:ln>
+              <a:t>(</a:t>
+            </a:r>
+            <a:r>
+              <a:rPr lang="en-US" sz="1200" kern="0" dirty="0" err="1">
                 <a:solidFill>
                   <a:schemeClr val="accent1">
                     <a:lumMod val="75000"/>
                   </a:schemeClr>
                 </a:solidFill>
-                <a:effectLst/>
-                <a:uLnTx/>
-                <a:uFillTx/>
               </a:rPr>
-              <a:t>(index</a:t>
-            </a:r>
-            <a:r>
-              <a:rPr kumimoji="0" lang="en-US" sz="1200" b="0" i="0" u="none" strike="noStrike" kern="0" cap="none" spc="0" normalizeH="0" baseline="0" noProof="0" dirty="0">
-                <a:ln>
-                  <a:noFill/>
-                </a:ln>
+              <a:t>AddEvent</a:t>
+            </a:r>
+            <a:r>
+              <a:rPr lang="en-US" sz="1200" kern="0" dirty="0">
                 <a:solidFill>
                   <a:srgbClr val="00B0F0"/>
                 </a:solidFill>
-                <a:effectLst/>
-                <a:uLnTx/>
-                <a:uFillTx/>
               </a:rPr>
               <a:t>)</a:t>
             </a:r>
+            <a:endParaRPr kumimoji="0" lang="en-US" sz="1200" b="0" i="0" u="none" strike="noStrike" kern="0" cap="none" spc="0" normalizeH="0" baseline="0" noProof="0" dirty="0">
+              <a:ln>
+                <a:noFill/>
+              </a:ln>
+              <a:solidFill>
+                <a:srgbClr val="00B0F0"/>
+              </a:solidFill>
+              <a:effectLst/>
+              <a:uLnTx/>
+              <a:uFillTx/>
+            </a:endParaRPr>
           </a:p>
         </p:txBody>
       </p:sp>
@@ -6824,7 +6268,7 @@
         </p:nvCxnSpPr>
         <p:spPr>
           <a:xfrm flipV="1">
-            <a:off x="3250282" y="5629448"/>
+            <a:off x="8005162" y="5204285"/>
             <a:ext cx="1583648" cy="4100"/>
           </a:xfrm>
           <a:prstGeom prst="straightConnector1">
@@ -6844,10 +6288,10 @@
       </p:cxnSp>
       <p:cxnSp>
         <p:nvCxnSpPr>
-          <p:cNvPr id="223" name="Straight Arrow Connector 222">
-            <a:extLst>
-              <a:ext uri="{FF2B5EF4-FFF2-40B4-BE49-F238E27FC236}">
-                <a16:creationId xmlns:a16="http://schemas.microsoft.com/office/drawing/2014/main" id="{202B774B-71C1-4FED-986A-F37AC85B07FD}"/>
+          <p:cNvPr id="81" name="Straight Connector 80">
+            <a:extLst>
+              <a:ext uri="{FF2B5EF4-FFF2-40B4-BE49-F238E27FC236}">
+                <a16:creationId xmlns:a16="http://schemas.microsoft.com/office/drawing/2014/main" id="{DDD3EDC1-4153-482A-BA18-3F202E353E98}"/>
               </a:ext>
             </a:extLst>
           </p:cNvPr>
@@ -6858,54 +6302,8 @@
         </p:nvCxnSpPr>
         <p:spPr>
           <a:xfrm>
-            <a:off x="12410695" y="6009746"/>
-            <a:ext cx="1217240" cy="0"/>
-          </a:xfrm>
-          <a:prstGeom prst="straightConnector1">
-            <a:avLst/>
-          </a:prstGeom>
-          <a:ln w="19050">
-            <a:solidFill>
-              <a:schemeClr val="accent6">
-                <a:lumMod val="75000"/>
-              </a:schemeClr>
-            </a:solidFill>
-            <a:tailEnd type="arrow"/>
-          </a:ln>
-        </p:spPr>
-        <p:style>
-          <a:lnRef idx="1">
-            <a:schemeClr val="accent1"/>
-          </a:lnRef>
-          <a:fillRef idx="0">
-            <a:schemeClr val="accent1"/>
-          </a:fillRef>
-          <a:effectRef idx="0">
-            <a:schemeClr val="accent1"/>
-          </a:effectRef>
-          <a:fontRef idx="minor">
-            <a:schemeClr val="tx1"/>
-          </a:fontRef>
-        </p:style>
-      </p:cxnSp>
-      <p:cxnSp>
-        <p:nvCxnSpPr>
-          <p:cNvPr id="81" name="Straight Connector 80">
-            <a:extLst>
-              <a:ext uri="{FF2B5EF4-FFF2-40B4-BE49-F238E27FC236}">
-                <a16:creationId xmlns:a16="http://schemas.microsoft.com/office/drawing/2014/main" id="{DDD3EDC1-4153-482A-BA18-3F202E353E98}"/>
-              </a:ext>
-            </a:extLst>
-          </p:cNvPr>
-          <p:cNvCxnSpPr>
-            <a:cxnSpLocks/>
-          </p:cNvCxnSpPr>
-          <p:nvPr/>
-        </p:nvCxnSpPr>
-        <p:spPr>
-          <a:xfrm>
-            <a:off x="3184680" y="5002859"/>
-            <a:ext cx="0" cy="1313774"/>
+            <a:off x="7939560" y="4577696"/>
+            <a:ext cx="0" cy="2280304"/>
           </a:xfrm>
           <a:prstGeom prst="line">
             <a:avLst/>
@@ -6947,7 +6345,7 @@
         </p:nvCxnSpPr>
         <p:spPr>
           <a:xfrm>
-            <a:off x="3118741" y="6316633"/>
+            <a:off x="7873621" y="6826094"/>
             <a:ext cx="131541" cy="148175"/>
           </a:xfrm>
           <a:prstGeom prst="line">
@@ -6971,62 +6369,6 @@
       </p:cxnSp>
       <p:cxnSp>
         <p:nvCxnSpPr>
-          <p:cNvPr id="70" name="Straight Connector 69">
-            <a:extLst>
-              <a:ext uri="{FF2B5EF4-FFF2-40B4-BE49-F238E27FC236}">
-                <a16:creationId xmlns:a16="http://schemas.microsoft.com/office/drawing/2014/main" id="{4370D27A-9E8E-4BA9-8604-A66B202D1312}"/>
-              </a:ext>
-            </a:extLst>
-          </p:cNvPr>
-          <p:cNvCxnSpPr>
-            <a:cxnSpLocks/>
-          </p:cNvCxnSpPr>
-          <p:nvPr/>
-        </p:nvCxnSpPr>
-        <p:spPr>
-          <a:xfrm>
-            <a:off x="10067365" y="2065402"/>
-            <a:ext cx="0" cy="4219263"/>
-          </a:xfrm>
-          <a:prstGeom prst="line">
-            <a:avLst/>
-          </a:prstGeom>
-          <a:gradFill rotWithShape="1">
-            <a:gsLst>
-              <a:gs pos="0">
-                <a:srgbClr val="4F81BD">
-                  <a:tint val="50000"/>
-                  <a:satMod val="300000"/>
-                </a:srgbClr>
-              </a:gs>
-              <a:gs pos="35000">
-                <a:srgbClr val="4F81BD">
-                  <a:tint val="37000"/>
-                  <a:satMod val="300000"/>
-                </a:srgbClr>
-              </a:gs>
-              <a:gs pos="100000">
-                <a:srgbClr val="4F81BD">
-                  <a:tint val="15000"/>
-                  <a:satMod val="350000"/>
-                </a:srgbClr>
-              </a:gs>
-            </a:gsLst>
-            <a:lin ang="16200000" scaled="1"/>
-          </a:gradFill>
-          <a:ln w="19050" cap="flat" cmpd="sng" algn="ctr">
-            <a:solidFill>
-              <a:schemeClr val="accent2">
-                <a:lumMod val="75000"/>
-              </a:schemeClr>
-            </a:solidFill>
-            <a:prstDash val="sysDash"/>
-          </a:ln>
-          <a:effectLst/>
-        </p:spPr>
-      </p:cxnSp>
-      <p:cxnSp>
-        <p:nvCxnSpPr>
           <p:cNvPr id="23" name="Straight Connector 22">
             <a:extLst>
               <a:ext uri="{FF2B5EF4-FFF2-40B4-BE49-F238E27FC236}">
@@ -7039,7 +6381,7 @@
         </p:nvCxnSpPr>
         <p:spPr>
           <a:xfrm flipV="1">
-            <a:off x="3118741" y="6316633"/>
+            <a:off x="7873621" y="6826094"/>
             <a:ext cx="131541" cy="148175"/>
           </a:xfrm>
           <a:prstGeom prst="line">
@@ -7061,59 +6403,102 @@
           </a:fontRef>
         </p:style>
       </p:cxnSp>
-      <p:sp>
-        <p:nvSpPr>
-          <p:cNvPr id="68" name="TextBox 67">
-            <a:extLst>
-              <a:ext uri="{FF2B5EF4-FFF2-40B4-BE49-F238E27FC236}">
-                <a16:creationId xmlns:a16="http://schemas.microsoft.com/office/drawing/2014/main" id="{D373D2D2-CE75-487B-8EE7-7A032B065A3A}"/>
-              </a:ext>
-            </a:extLst>
-          </p:cNvPr>
-          <p:cNvSpPr txBox="1"/>
+      <p:cxnSp>
+        <p:nvCxnSpPr>
+          <p:cNvPr id="71" name="Straight Connector 70">
+            <a:extLst>
+              <a:ext uri="{FF2B5EF4-FFF2-40B4-BE49-F238E27FC236}">
+                <a16:creationId xmlns:a16="http://schemas.microsoft.com/office/drawing/2014/main" id="{3B60151B-30CD-4BA2-BED8-C3381BF85BF5}"/>
+              </a:ext>
+            </a:extLst>
+          </p:cNvPr>
+          <p:cNvCxnSpPr>
+            <a:cxnSpLocks/>
+          </p:cNvCxnSpPr>
           <p:nvPr/>
-        </p:nvSpPr>
-        <p:spPr>
-          <a:xfrm>
-            <a:off x="-3283651" y="1946542"/>
-            <a:ext cx="1667016" cy="430887"/>
-          </a:xfrm>
-          <a:prstGeom prst="rect">
+        </p:nvCxnSpPr>
+        <p:spPr>
+          <a:xfrm flipH="1">
+            <a:off x="3145298" y="1492966"/>
+            <a:ext cx="1" cy="5365034"/>
+          </a:xfrm>
+          <a:prstGeom prst="line">
             <a:avLst/>
           </a:prstGeom>
-          <a:noFill/>
-        </p:spPr>
-        <p:txBody>
-          <a:bodyPr wrap="square" lIns="0" tIns="0" rIns="0" bIns="0" rtlCol="0">
-            <a:spAutoFit/>
-          </a:bodyPr>
-          <a:lstStyle>
-            <a:defPPr>
-              <a:defRPr lang="en-US"/>
-            </a:defPPr>
-            <a:lvl1pPr algn="r">
-              <a:defRPr sz="1400">
-                <a:solidFill>
-                  <a:srgbClr val="0070C0"/>
-                </a:solidFill>
-              </a:defRPr>
-            </a:lvl1pPr>
-          </a:lstStyle>
-          <a:p>
-            <a:pPr algn="ctr"/>
-            <a:r>
-              <a:rPr lang="en-US" dirty="0"/>
-              <a:t>execute(“add y/1 s/1 c/MA1521”)</a:t>
-            </a:r>
-          </a:p>
-        </p:txBody>
-      </p:sp>
-      <p:sp>
-        <p:nvSpPr>
-          <p:cNvPr id="149" name="Rectangle 148">
-            <a:extLst>
-              <a:ext uri="{FF2B5EF4-FFF2-40B4-BE49-F238E27FC236}">
-                <a16:creationId xmlns:a16="http://schemas.microsoft.com/office/drawing/2014/main" id="{A4897E7E-52EC-46DE-A1FF-03C261E666B3}"/>
+          <a:ln w="19050">
+            <a:solidFill>
+              <a:srgbClr val="0070C0"/>
+            </a:solidFill>
+            <a:prstDash val="sysDash"/>
+          </a:ln>
+          <a:effectLst/>
+        </p:spPr>
+        <p:style>
+          <a:lnRef idx="1">
+            <a:schemeClr val="accent1"/>
+          </a:lnRef>
+          <a:fillRef idx="2">
+            <a:schemeClr val="accent1"/>
+          </a:fillRef>
+          <a:effectRef idx="1">
+            <a:schemeClr val="accent1"/>
+          </a:effectRef>
+          <a:fontRef idx="minor">
+            <a:schemeClr val="dk1"/>
+          </a:fontRef>
+        </p:style>
+      </p:cxnSp>
+      <p:cxnSp>
+        <p:nvCxnSpPr>
+          <p:cNvPr id="72" name="Straight Connector 71">
+            <a:extLst>
+              <a:ext uri="{FF2B5EF4-FFF2-40B4-BE49-F238E27FC236}">
+                <a16:creationId xmlns:a16="http://schemas.microsoft.com/office/drawing/2014/main" id="{D7395F84-B1EB-47D3-9BCA-C74DFE2B78AD}"/>
+              </a:ext>
+            </a:extLst>
+          </p:cNvPr>
+          <p:cNvCxnSpPr>
+            <a:cxnSpLocks/>
+          </p:cNvCxnSpPr>
+          <p:nvPr/>
+        </p:nvCxnSpPr>
+        <p:spPr>
+          <a:xfrm flipH="1">
+            <a:off x="7900629" y="3306638"/>
+            <a:ext cx="11140" cy="1733460"/>
+          </a:xfrm>
+          <a:prstGeom prst="line">
+            <a:avLst/>
+          </a:prstGeom>
+          <a:ln w="19050">
+            <a:solidFill>
+              <a:srgbClr val="0070C0"/>
+            </a:solidFill>
+            <a:prstDash val="sysDash"/>
+          </a:ln>
+          <a:effectLst/>
+        </p:spPr>
+        <p:style>
+          <a:lnRef idx="1">
+            <a:schemeClr val="accent1"/>
+          </a:lnRef>
+          <a:fillRef idx="2">
+            <a:schemeClr val="accent1"/>
+          </a:fillRef>
+          <a:effectRef idx="1">
+            <a:schemeClr val="accent1"/>
+          </a:effectRef>
+          <a:fontRef idx="minor">
+            <a:schemeClr val="dk1"/>
+          </a:fontRef>
+        </p:style>
+      </p:cxnSp>
+      <p:sp>
+        <p:nvSpPr>
+          <p:cNvPr id="74" name="Rectangle 65">
+            <a:extLst>
+              <a:ext uri="{FF2B5EF4-FFF2-40B4-BE49-F238E27FC236}">
+                <a16:creationId xmlns:a16="http://schemas.microsoft.com/office/drawing/2014/main" id="{89A9DDDD-0188-4F02-9814-E5EDA00A427F}"/>
               </a:ext>
             </a:extLst>
           </p:cNvPr>
@@ -7122,18 +6507,85 @@
         </p:nvSpPr>
         <p:spPr>
           <a:xfrm>
-            <a:off x="9926989" y="5818097"/>
-            <a:ext cx="198772" cy="275243"/>
+            <a:off x="-438241" y="854995"/>
+            <a:ext cx="2011484" cy="5860233"/>
+          </a:xfrm>
+          <a:prstGeom prst="roundRect">
+            <a:avLst>
+              <a:gd name="adj" fmla="val 3484"/>
+            </a:avLst>
+          </a:prstGeom>
+          <a:solidFill>
+            <a:schemeClr val="accent6">
+              <a:lumMod val="20000"/>
+              <a:lumOff val="80000"/>
+            </a:schemeClr>
+          </a:solidFill>
+          <a:ln w="19050">
+            <a:noFill/>
+          </a:ln>
+          <a:effectLst/>
+        </p:spPr>
+        <p:style>
+          <a:lnRef idx="1">
+            <a:schemeClr val="accent2"/>
+          </a:lnRef>
+          <a:fillRef idx="2">
+            <a:schemeClr val="accent2"/>
+          </a:fillRef>
+          <a:effectRef idx="1">
+            <a:schemeClr val="accent2"/>
+          </a:effectRef>
+          <a:fontRef idx="minor">
+            <a:schemeClr val="dk1"/>
+          </a:fontRef>
+        </p:style>
+        <p:txBody>
+          <a:bodyPr rtlCol="0" anchor="t"/>
+          <a:lstStyle/>
+          <a:p>
+            <a:r>
+              <a:rPr lang="en-US" sz="1200" b="1" dirty="0">
+                <a:solidFill>
+                  <a:schemeClr val="accent6"/>
+                </a:solidFill>
+              </a:rPr>
+              <a:t>UI</a:t>
+            </a:r>
+            <a:endParaRPr lang="en-SG" sz="1200" b="1" dirty="0">
+              <a:solidFill>
+                <a:schemeClr val="accent6"/>
+              </a:solidFill>
+            </a:endParaRPr>
+          </a:p>
+        </p:txBody>
+      </p:sp>
+      <p:sp>
+        <p:nvSpPr>
+          <p:cNvPr id="75" name="Rectangle 74">
+            <a:extLst>
+              <a:ext uri="{FF2B5EF4-FFF2-40B4-BE49-F238E27FC236}">
+                <a16:creationId xmlns:a16="http://schemas.microsoft.com/office/drawing/2014/main" id="{DF17492F-47BA-47EA-92B9-5D3C92AF6EC6}"/>
+              </a:ext>
+            </a:extLst>
+          </p:cNvPr>
+          <p:cNvSpPr/>
+          <p:nvPr/>
+        </p:nvSpPr>
+        <p:spPr>
+          <a:xfrm>
+            <a:off x="-299687" y="2371267"/>
+            <a:ext cx="1686016" cy="335753"/>
           </a:xfrm>
           <a:prstGeom prst="rect">
             <a:avLst/>
           </a:prstGeom>
           <a:solidFill>
-            <a:schemeClr val="accent2"/>
+            <a:schemeClr val="accent6"/>
           </a:solidFill>
           <a:ln>
             <a:solidFill>
-              <a:schemeClr val="accent2"/>
+              <a:schemeClr val="accent6"/>
             </a:solidFill>
           </a:ln>
         </p:spPr>
@@ -7158,16 +6610,24 @@
           <a:lstStyle/>
           <a:p>
             <a:pPr algn="ctr"/>
+            <a:r>
+              <a:rPr lang="en-US" dirty="0"/>
+              <a:t>:</a:t>
+            </a:r>
+            <a:r>
+              <a:rPr lang="en-US" dirty="0" err="1"/>
+              <a:t>MainWindow</a:t>
+            </a:r>
             <a:endParaRPr lang="en-US" dirty="0"/>
           </a:p>
         </p:txBody>
       </p:sp>
       <p:cxnSp>
         <p:nvCxnSpPr>
-          <p:cNvPr id="73" name="Straight Connector 72">
-            <a:extLst>
-              <a:ext uri="{FF2B5EF4-FFF2-40B4-BE49-F238E27FC236}">
-                <a16:creationId xmlns:a16="http://schemas.microsoft.com/office/drawing/2014/main" id="{15E65A6D-7A75-4BAA-A66F-E76A9FF292F8}"/>
+          <p:cNvPr id="77" name="Straight Connector 76">
+            <a:extLst>
+              <a:ext uri="{FF2B5EF4-FFF2-40B4-BE49-F238E27FC236}">
+                <a16:creationId xmlns:a16="http://schemas.microsoft.com/office/drawing/2014/main" id="{064EDA1F-6E9B-47CA-BD1E-46A7208AC08B}"/>
               </a:ext>
             </a:extLst>
           </p:cNvPr>
@@ -7178,8 +6638,8 @@
         </p:nvCxnSpPr>
         <p:spPr>
           <a:xfrm>
-            <a:off x="12304597" y="2114419"/>
-            <a:ext cx="0" cy="4219263"/>
+            <a:off x="550036" y="2707020"/>
+            <a:ext cx="4996" cy="4193161"/>
           </a:xfrm>
           <a:prstGeom prst="line">
             <a:avLst/>
@@ -7220,10 +6680,10 @@
       </p:cxnSp>
       <p:sp>
         <p:nvSpPr>
-          <p:cNvPr id="154" name="Rectangle 153">
-            <a:extLst>
-              <a:ext uri="{FF2B5EF4-FFF2-40B4-BE49-F238E27FC236}">
-                <a16:creationId xmlns:a16="http://schemas.microsoft.com/office/drawing/2014/main" id="{BE04A8D3-B1AF-48C4-87B1-68DBE10DD703}"/>
+          <p:cNvPr id="78" name="Rectangle 77">
+            <a:extLst>
+              <a:ext uri="{FF2B5EF4-FFF2-40B4-BE49-F238E27FC236}">
+                <a16:creationId xmlns:a16="http://schemas.microsoft.com/office/drawing/2014/main" id="{6DF01679-F136-479C-918D-7C42A5BC97D7}"/>
               </a:ext>
             </a:extLst>
           </p:cNvPr>
@@ -7232,8 +6692,8 @@
         </p:nvSpPr>
         <p:spPr>
           <a:xfrm>
-            <a:off x="12220913" y="5908914"/>
-            <a:ext cx="184743" cy="179346"/>
+            <a:off x="485947" y="6018423"/>
+            <a:ext cx="174814" cy="531357"/>
           </a:xfrm>
           <a:prstGeom prst="rect">
             <a:avLst/>
@@ -7272,12 +6732,326 @@
           </a:p>
         </p:txBody>
       </p:sp>
+      <p:sp>
+        <p:nvSpPr>
+          <p:cNvPr id="86" name="Rectangle 65">
+            <a:extLst>
+              <a:ext uri="{FF2B5EF4-FFF2-40B4-BE49-F238E27FC236}">
+                <a16:creationId xmlns:a16="http://schemas.microsoft.com/office/drawing/2014/main" id="{E250E23F-5619-2E45-AFBA-F53DEB9BBC46}"/>
+              </a:ext>
+            </a:extLst>
+          </p:cNvPr>
+          <p:cNvSpPr/>
+          <p:nvPr/>
+        </p:nvSpPr>
+        <p:spPr>
+          <a:xfrm>
+            <a:off x="13743959" y="883609"/>
+            <a:ext cx="2005114" cy="5876557"/>
+          </a:xfrm>
+          <a:prstGeom prst="roundRect">
+            <a:avLst>
+              <a:gd name="adj" fmla="val 3484"/>
+            </a:avLst>
+          </a:prstGeom>
+          <a:solidFill>
+            <a:srgbClr val="B4D1D9"/>
+          </a:solidFill>
+          <a:ln w="19050">
+            <a:noFill/>
+          </a:ln>
+          <a:effectLst/>
+        </p:spPr>
+        <p:style>
+          <a:lnRef idx="1">
+            <a:schemeClr val="accent2"/>
+          </a:lnRef>
+          <a:fillRef idx="2">
+            <a:schemeClr val="accent2"/>
+          </a:fillRef>
+          <a:effectRef idx="1">
+            <a:schemeClr val="accent2"/>
+          </a:effectRef>
+          <a:fontRef idx="minor">
+            <a:schemeClr val="dk1"/>
+          </a:fontRef>
+        </p:style>
+        <p:txBody>
+          <a:bodyPr rtlCol="0" anchor="t"/>
+          <a:lstStyle>
+            <a:defPPr>
+              <a:defRPr lang="en-US"/>
+            </a:defPPr>
+            <a:lvl1pPr marL="0" algn="l" defTabSz="914400" rtl="0" eaLnBrk="1" latinLnBrk="0" hangingPunct="1">
+              <a:defRPr sz="1800" kern="1200">
+                <a:solidFill>
+                  <a:schemeClr val="dk1"/>
+                </a:solidFill>
+                <a:latin typeface="+mn-lt"/>
+                <a:ea typeface="+mn-ea"/>
+                <a:cs typeface="+mn-cs"/>
+              </a:defRPr>
+            </a:lvl1pPr>
+            <a:lvl2pPr marL="457200" algn="l" defTabSz="914400" rtl="0" eaLnBrk="1" latinLnBrk="0" hangingPunct="1">
+              <a:defRPr sz="1800" kern="1200">
+                <a:solidFill>
+                  <a:schemeClr val="dk1"/>
+                </a:solidFill>
+                <a:latin typeface="+mn-lt"/>
+                <a:ea typeface="+mn-ea"/>
+                <a:cs typeface="+mn-cs"/>
+              </a:defRPr>
+            </a:lvl2pPr>
+            <a:lvl3pPr marL="914400" algn="l" defTabSz="914400" rtl="0" eaLnBrk="1" latinLnBrk="0" hangingPunct="1">
+              <a:defRPr sz="1800" kern="1200">
+                <a:solidFill>
+                  <a:schemeClr val="dk1"/>
+                </a:solidFill>
+                <a:latin typeface="+mn-lt"/>
+                <a:ea typeface="+mn-ea"/>
+                <a:cs typeface="+mn-cs"/>
+              </a:defRPr>
+            </a:lvl3pPr>
+            <a:lvl4pPr marL="1371600" algn="l" defTabSz="914400" rtl="0" eaLnBrk="1" latinLnBrk="0" hangingPunct="1">
+              <a:defRPr sz="1800" kern="1200">
+                <a:solidFill>
+                  <a:schemeClr val="dk1"/>
+                </a:solidFill>
+                <a:latin typeface="+mn-lt"/>
+                <a:ea typeface="+mn-ea"/>
+                <a:cs typeface="+mn-cs"/>
+              </a:defRPr>
+            </a:lvl4pPr>
+            <a:lvl5pPr marL="1828800" algn="l" defTabSz="914400" rtl="0" eaLnBrk="1" latinLnBrk="0" hangingPunct="1">
+              <a:defRPr sz="1800" kern="1200">
+                <a:solidFill>
+                  <a:schemeClr val="dk1"/>
+                </a:solidFill>
+                <a:latin typeface="+mn-lt"/>
+                <a:ea typeface="+mn-ea"/>
+                <a:cs typeface="+mn-cs"/>
+              </a:defRPr>
+            </a:lvl5pPr>
+            <a:lvl6pPr marL="2286000" algn="l" defTabSz="914400" rtl="0" eaLnBrk="1" latinLnBrk="0" hangingPunct="1">
+              <a:defRPr sz="1800" kern="1200">
+                <a:solidFill>
+                  <a:schemeClr val="dk1"/>
+                </a:solidFill>
+                <a:latin typeface="+mn-lt"/>
+                <a:ea typeface="+mn-ea"/>
+                <a:cs typeface="+mn-cs"/>
+              </a:defRPr>
+            </a:lvl6pPr>
+            <a:lvl7pPr marL="2743200" algn="l" defTabSz="914400" rtl="0" eaLnBrk="1" latinLnBrk="0" hangingPunct="1">
+              <a:defRPr sz="1800" kern="1200">
+                <a:solidFill>
+                  <a:schemeClr val="dk1"/>
+                </a:solidFill>
+                <a:latin typeface="+mn-lt"/>
+                <a:ea typeface="+mn-ea"/>
+                <a:cs typeface="+mn-cs"/>
+              </a:defRPr>
+            </a:lvl7pPr>
+            <a:lvl8pPr marL="3200400" algn="l" defTabSz="914400" rtl="0" eaLnBrk="1" latinLnBrk="0" hangingPunct="1">
+              <a:defRPr sz="1800" kern="1200">
+                <a:solidFill>
+                  <a:schemeClr val="dk1"/>
+                </a:solidFill>
+                <a:latin typeface="+mn-lt"/>
+                <a:ea typeface="+mn-ea"/>
+                <a:cs typeface="+mn-cs"/>
+              </a:defRPr>
+            </a:lvl8pPr>
+            <a:lvl9pPr marL="3657600" algn="l" defTabSz="914400" rtl="0" eaLnBrk="1" latinLnBrk="0" hangingPunct="1">
+              <a:defRPr sz="1800" kern="1200">
+                <a:solidFill>
+                  <a:schemeClr val="dk1"/>
+                </a:solidFill>
+                <a:latin typeface="+mn-lt"/>
+                <a:ea typeface="+mn-ea"/>
+                <a:cs typeface="+mn-cs"/>
+              </a:defRPr>
+            </a:lvl9pPr>
+          </a:lstStyle>
+          <a:p>
+            <a:r>
+              <a:rPr lang="en-US" sz="1200" b="1" dirty="0">
+                <a:solidFill>
+                  <a:srgbClr val="30869C"/>
+                </a:solidFill>
+              </a:rPr>
+              <a:t>Common</a:t>
+            </a:r>
+            <a:endParaRPr lang="en-SG" sz="1200" b="1" dirty="0">
+              <a:solidFill>
+                <a:srgbClr val="30869C"/>
+              </a:solidFill>
+            </a:endParaRPr>
+          </a:p>
+        </p:txBody>
+      </p:sp>
+      <p:sp>
+        <p:nvSpPr>
+          <p:cNvPr id="87" name="Rectangle 86">
+            <a:extLst>
+              <a:ext uri="{FF2B5EF4-FFF2-40B4-BE49-F238E27FC236}">
+                <a16:creationId xmlns:a16="http://schemas.microsoft.com/office/drawing/2014/main" id="{15348689-0344-6D41-954C-017127F1B3AB}"/>
+              </a:ext>
+            </a:extLst>
+          </p:cNvPr>
+          <p:cNvSpPr/>
+          <p:nvPr/>
+        </p:nvSpPr>
+        <p:spPr>
+          <a:xfrm>
+            <a:off x="13937840" y="1374973"/>
+            <a:ext cx="1485061" cy="333592"/>
+          </a:xfrm>
+          <a:prstGeom prst="rect">
+            <a:avLst/>
+          </a:prstGeom>
+          <a:solidFill>
+            <a:srgbClr val="30869C"/>
+          </a:solidFill>
+          <a:ln>
+            <a:solidFill>
+              <a:srgbClr val="30869C"/>
+            </a:solidFill>
+          </a:ln>
+        </p:spPr>
+        <p:style>
+          <a:lnRef idx="2">
+            <a:schemeClr val="accent1">
+              <a:shade val="50000"/>
+            </a:schemeClr>
+          </a:lnRef>
+          <a:fillRef idx="1">
+            <a:schemeClr val="accent1"/>
+          </a:fillRef>
+          <a:effectRef idx="0">
+            <a:schemeClr val="accent1"/>
+          </a:effectRef>
+          <a:fontRef idx="minor">
+            <a:schemeClr val="lt1"/>
+          </a:fontRef>
+        </p:style>
+        <p:txBody>
+          <a:bodyPr rtlCol="0" anchor="ctr"/>
+          <a:lstStyle>
+            <a:defPPr>
+              <a:defRPr lang="en-US"/>
+            </a:defPPr>
+            <a:lvl1pPr marL="0" algn="l" defTabSz="914400" rtl="0" eaLnBrk="1" latinLnBrk="0" hangingPunct="1">
+              <a:defRPr sz="1800" kern="1200">
+                <a:solidFill>
+                  <a:schemeClr val="lt1"/>
+                </a:solidFill>
+                <a:latin typeface="+mn-lt"/>
+                <a:ea typeface="+mn-ea"/>
+                <a:cs typeface="+mn-cs"/>
+              </a:defRPr>
+            </a:lvl1pPr>
+            <a:lvl2pPr marL="457200" algn="l" defTabSz="914400" rtl="0" eaLnBrk="1" latinLnBrk="0" hangingPunct="1">
+              <a:defRPr sz="1800" kern="1200">
+                <a:solidFill>
+                  <a:schemeClr val="lt1"/>
+                </a:solidFill>
+                <a:latin typeface="+mn-lt"/>
+                <a:ea typeface="+mn-ea"/>
+                <a:cs typeface="+mn-cs"/>
+              </a:defRPr>
+            </a:lvl2pPr>
+            <a:lvl3pPr marL="914400" algn="l" defTabSz="914400" rtl="0" eaLnBrk="1" latinLnBrk="0" hangingPunct="1">
+              <a:defRPr sz="1800" kern="1200">
+                <a:solidFill>
+                  <a:schemeClr val="lt1"/>
+                </a:solidFill>
+                <a:latin typeface="+mn-lt"/>
+                <a:ea typeface="+mn-ea"/>
+                <a:cs typeface="+mn-cs"/>
+              </a:defRPr>
+            </a:lvl3pPr>
+            <a:lvl4pPr marL="1371600" algn="l" defTabSz="914400" rtl="0" eaLnBrk="1" latinLnBrk="0" hangingPunct="1">
+              <a:defRPr sz="1800" kern="1200">
+                <a:solidFill>
+                  <a:schemeClr val="lt1"/>
+                </a:solidFill>
+                <a:latin typeface="+mn-lt"/>
+                <a:ea typeface="+mn-ea"/>
+                <a:cs typeface="+mn-cs"/>
+              </a:defRPr>
+            </a:lvl4pPr>
+            <a:lvl5pPr marL="1828800" algn="l" defTabSz="914400" rtl="0" eaLnBrk="1" latinLnBrk="0" hangingPunct="1">
+              <a:defRPr sz="1800" kern="1200">
+                <a:solidFill>
+                  <a:schemeClr val="lt1"/>
+                </a:solidFill>
+                <a:latin typeface="+mn-lt"/>
+                <a:ea typeface="+mn-ea"/>
+                <a:cs typeface="+mn-cs"/>
+              </a:defRPr>
+            </a:lvl5pPr>
+            <a:lvl6pPr marL="2286000" algn="l" defTabSz="914400" rtl="0" eaLnBrk="1" latinLnBrk="0" hangingPunct="1">
+              <a:defRPr sz="1800" kern="1200">
+                <a:solidFill>
+                  <a:schemeClr val="lt1"/>
+                </a:solidFill>
+                <a:latin typeface="+mn-lt"/>
+                <a:ea typeface="+mn-ea"/>
+                <a:cs typeface="+mn-cs"/>
+              </a:defRPr>
+            </a:lvl6pPr>
+            <a:lvl7pPr marL="2743200" algn="l" defTabSz="914400" rtl="0" eaLnBrk="1" latinLnBrk="0" hangingPunct="1">
+              <a:defRPr sz="1800" kern="1200">
+                <a:solidFill>
+                  <a:schemeClr val="lt1"/>
+                </a:solidFill>
+                <a:latin typeface="+mn-lt"/>
+                <a:ea typeface="+mn-ea"/>
+                <a:cs typeface="+mn-cs"/>
+              </a:defRPr>
+            </a:lvl7pPr>
+            <a:lvl8pPr marL="3200400" algn="l" defTabSz="914400" rtl="0" eaLnBrk="1" latinLnBrk="0" hangingPunct="1">
+              <a:defRPr sz="1800" kern="1200">
+                <a:solidFill>
+                  <a:schemeClr val="lt1"/>
+                </a:solidFill>
+                <a:latin typeface="+mn-lt"/>
+                <a:ea typeface="+mn-ea"/>
+                <a:cs typeface="+mn-cs"/>
+              </a:defRPr>
+            </a:lvl8pPr>
+            <a:lvl9pPr marL="3657600" algn="l" defTabSz="914400" rtl="0" eaLnBrk="1" latinLnBrk="0" hangingPunct="1">
+              <a:defRPr sz="1800" kern="1200">
+                <a:solidFill>
+                  <a:schemeClr val="lt1"/>
+                </a:solidFill>
+                <a:latin typeface="+mn-lt"/>
+                <a:ea typeface="+mn-ea"/>
+                <a:cs typeface="+mn-cs"/>
+              </a:defRPr>
+            </a:lvl9pPr>
+          </a:lstStyle>
+          <a:p>
+            <a:pPr algn="ctr"/>
+            <a:r>
+              <a:rPr lang="en-US" dirty="0"/>
+              <a:t>:</a:t>
+            </a:r>
+            <a:r>
+              <a:rPr lang="en-US" dirty="0" err="1"/>
+              <a:t>EventsCenter</a:t>
+            </a:r>
+            <a:endParaRPr lang="en-US" dirty="0"/>
+          </a:p>
+        </p:txBody>
+      </p:sp>
       <p:cxnSp>
         <p:nvCxnSpPr>
-          <p:cNvPr id="71" name="Straight Connector 70">
-            <a:extLst>
-              <a:ext uri="{FF2B5EF4-FFF2-40B4-BE49-F238E27FC236}">
-                <a16:creationId xmlns:a16="http://schemas.microsoft.com/office/drawing/2014/main" id="{3B60151B-30CD-4BA2-BED8-C3381BF85BF5}"/>
+          <p:cNvPr id="88" name="Straight Connector 87">
+            <a:extLst>
+              <a:ext uri="{FF2B5EF4-FFF2-40B4-BE49-F238E27FC236}">
+                <a16:creationId xmlns:a16="http://schemas.microsoft.com/office/drawing/2014/main" id="{B5FC1D4D-A002-3343-9A29-56CD76711737}"/>
               </a:ext>
             </a:extLst>
           </p:cNvPr>
@@ -7287,42 +7061,234 @@
           <p:nvPr/>
         </p:nvCxnSpPr>
         <p:spPr>
-          <a:xfrm flipH="1">
-            <a:off x="-1616635" y="1918129"/>
-            <a:ext cx="7053" cy="4415553"/>
+          <a:xfrm>
+            <a:off x="14680370" y="1659848"/>
+            <a:ext cx="0" cy="5240333"/>
           </a:xfrm>
           <a:prstGeom prst="line">
+            <a:avLst/>
+          </a:prstGeom>
+          <a:ln w="19050">
+            <a:solidFill>
+              <a:srgbClr val="30869C"/>
+            </a:solidFill>
+            <a:prstDash val="sysDash"/>
+          </a:ln>
+          <a:effectLst/>
+        </p:spPr>
+        <p:style>
+          <a:lnRef idx="1">
+            <a:schemeClr val="accent1"/>
+          </a:lnRef>
+          <a:fillRef idx="2">
+            <a:schemeClr val="accent1"/>
+          </a:fillRef>
+          <a:effectRef idx="1">
+            <a:schemeClr val="accent1"/>
+          </a:effectRef>
+          <a:fontRef idx="minor">
+            <a:schemeClr val="dk1"/>
+          </a:fontRef>
+        </p:style>
+      </p:cxnSp>
+      <p:sp>
+        <p:nvSpPr>
+          <p:cNvPr id="89" name="Rectangle 88">
+            <a:extLst>
+              <a:ext uri="{FF2B5EF4-FFF2-40B4-BE49-F238E27FC236}">
+                <a16:creationId xmlns:a16="http://schemas.microsoft.com/office/drawing/2014/main" id="{A053926C-E24E-C447-850E-C406861D988F}"/>
+              </a:ext>
+            </a:extLst>
+          </p:cNvPr>
+          <p:cNvSpPr/>
+          <p:nvPr/>
+        </p:nvSpPr>
+        <p:spPr>
+          <a:xfrm>
+            <a:off x="14576879" y="4589680"/>
+            <a:ext cx="185934" cy="2125552"/>
+          </a:xfrm>
+          <a:prstGeom prst="rect">
+            <a:avLst/>
+          </a:prstGeom>
+          <a:solidFill>
+            <a:srgbClr val="30869C"/>
+          </a:solidFill>
+          <a:ln>
+            <a:solidFill>
+              <a:srgbClr val="30869C"/>
+            </a:solidFill>
+          </a:ln>
+        </p:spPr>
+        <p:style>
+          <a:lnRef idx="2">
+            <a:schemeClr val="accent1">
+              <a:shade val="50000"/>
+            </a:schemeClr>
+          </a:lnRef>
+          <a:fillRef idx="1">
+            <a:schemeClr val="accent1"/>
+          </a:fillRef>
+          <a:effectRef idx="0">
+            <a:schemeClr val="accent1"/>
+          </a:effectRef>
+          <a:fontRef idx="minor">
+            <a:schemeClr val="lt1"/>
+          </a:fontRef>
+        </p:style>
+        <p:txBody>
+          <a:bodyPr rtlCol="0" anchor="ctr"/>
+          <a:lstStyle>
+            <a:defPPr>
+              <a:defRPr lang="en-US"/>
+            </a:defPPr>
+            <a:lvl1pPr marL="0" algn="l" defTabSz="914400" rtl="0" eaLnBrk="1" latinLnBrk="0" hangingPunct="1">
+              <a:defRPr sz="1800" kern="1200">
+                <a:solidFill>
+                  <a:schemeClr val="lt1"/>
+                </a:solidFill>
+                <a:latin typeface="+mn-lt"/>
+                <a:ea typeface="+mn-ea"/>
+                <a:cs typeface="+mn-cs"/>
+              </a:defRPr>
+            </a:lvl1pPr>
+            <a:lvl2pPr marL="457200" algn="l" defTabSz="914400" rtl="0" eaLnBrk="1" latinLnBrk="0" hangingPunct="1">
+              <a:defRPr sz="1800" kern="1200">
+                <a:solidFill>
+                  <a:schemeClr val="lt1"/>
+                </a:solidFill>
+                <a:latin typeface="+mn-lt"/>
+                <a:ea typeface="+mn-ea"/>
+                <a:cs typeface="+mn-cs"/>
+              </a:defRPr>
+            </a:lvl2pPr>
+            <a:lvl3pPr marL="914400" algn="l" defTabSz="914400" rtl="0" eaLnBrk="1" latinLnBrk="0" hangingPunct="1">
+              <a:defRPr sz="1800" kern="1200">
+                <a:solidFill>
+                  <a:schemeClr val="lt1"/>
+                </a:solidFill>
+                <a:latin typeface="+mn-lt"/>
+                <a:ea typeface="+mn-ea"/>
+                <a:cs typeface="+mn-cs"/>
+              </a:defRPr>
+            </a:lvl3pPr>
+            <a:lvl4pPr marL="1371600" algn="l" defTabSz="914400" rtl="0" eaLnBrk="1" latinLnBrk="0" hangingPunct="1">
+              <a:defRPr sz="1800" kern="1200">
+                <a:solidFill>
+                  <a:schemeClr val="lt1"/>
+                </a:solidFill>
+                <a:latin typeface="+mn-lt"/>
+                <a:ea typeface="+mn-ea"/>
+                <a:cs typeface="+mn-cs"/>
+              </a:defRPr>
+            </a:lvl4pPr>
+            <a:lvl5pPr marL="1828800" algn="l" defTabSz="914400" rtl="0" eaLnBrk="1" latinLnBrk="0" hangingPunct="1">
+              <a:defRPr sz="1800" kern="1200">
+                <a:solidFill>
+                  <a:schemeClr val="lt1"/>
+                </a:solidFill>
+                <a:latin typeface="+mn-lt"/>
+                <a:ea typeface="+mn-ea"/>
+                <a:cs typeface="+mn-cs"/>
+              </a:defRPr>
+            </a:lvl5pPr>
+            <a:lvl6pPr marL="2286000" algn="l" defTabSz="914400" rtl="0" eaLnBrk="1" latinLnBrk="0" hangingPunct="1">
+              <a:defRPr sz="1800" kern="1200">
+                <a:solidFill>
+                  <a:schemeClr val="lt1"/>
+                </a:solidFill>
+                <a:latin typeface="+mn-lt"/>
+                <a:ea typeface="+mn-ea"/>
+                <a:cs typeface="+mn-cs"/>
+              </a:defRPr>
+            </a:lvl6pPr>
+            <a:lvl7pPr marL="2743200" algn="l" defTabSz="914400" rtl="0" eaLnBrk="1" latinLnBrk="0" hangingPunct="1">
+              <a:defRPr sz="1800" kern="1200">
+                <a:solidFill>
+                  <a:schemeClr val="lt1"/>
+                </a:solidFill>
+                <a:latin typeface="+mn-lt"/>
+                <a:ea typeface="+mn-ea"/>
+                <a:cs typeface="+mn-cs"/>
+              </a:defRPr>
+            </a:lvl7pPr>
+            <a:lvl8pPr marL="3200400" algn="l" defTabSz="914400" rtl="0" eaLnBrk="1" latinLnBrk="0" hangingPunct="1">
+              <a:defRPr sz="1800" kern="1200">
+                <a:solidFill>
+                  <a:schemeClr val="lt1"/>
+                </a:solidFill>
+                <a:latin typeface="+mn-lt"/>
+                <a:ea typeface="+mn-ea"/>
+                <a:cs typeface="+mn-cs"/>
+              </a:defRPr>
+            </a:lvl8pPr>
+            <a:lvl9pPr marL="3657600" algn="l" defTabSz="914400" rtl="0" eaLnBrk="1" latinLnBrk="0" hangingPunct="1">
+              <a:defRPr sz="1800" kern="1200">
+                <a:solidFill>
+                  <a:schemeClr val="lt1"/>
+                </a:solidFill>
+                <a:latin typeface="+mn-lt"/>
+                <a:ea typeface="+mn-ea"/>
+                <a:cs typeface="+mn-cs"/>
+              </a:defRPr>
+            </a:lvl9pPr>
+          </a:lstStyle>
+          <a:p>
+            <a:pPr algn="ctr"/>
+            <a:endParaRPr lang="en-US" dirty="0"/>
+          </a:p>
+        </p:txBody>
+      </p:sp>
+      <p:cxnSp>
+        <p:nvCxnSpPr>
+          <p:cNvPr id="147" name="Straight Arrow Connector 146">
+            <a:extLst>
+              <a:ext uri="{FF2B5EF4-FFF2-40B4-BE49-F238E27FC236}">
+                <a16:creationId xmlns:a16="http://schemas.microsoft.com/office/drawing/2014/main" id="{0AECEA8F-8DD8-401A-B83A-6F657FDBE321}"/>
+              </a:ext>
+            </a:extLst>
+          </p:cNvPr>
+          <p:cNvCxnSpPr>
+            <a:cxnSpLocks/>
+          </p:cNvCxnSpPr>
+          <p:nvPr/>
+        </p:nvCxnSpPr>
+        <p:spPr>
+          <a:xfrm>
+            <a:off x="7863815" y="5410005"/>
+            <a:ext cx="6713064" cy="22357"/>
+          </a:xfrm>
+          <a:prstGeom prst="straightConnector1">
             <a:avLst/>
           </a:prstGeom>
           <a:ln w="19050">
             <a:solidFill>
               <a:srgbClr val="0070C0"/>
             </a:solidFill>
-            <a:prstDash val="sysDash"/>
+            <a:tailEnd type="arrow"/>
           </a:ln>
-          <a:effectLst/>
         </p:spPr>
         <p:style>
           <a:lnRef idx="1">
             <a:schemeClr val="accent1"/>
           </a:lnRef>
-          <a:fillRef idx="2">
+          <a:fillRef idx="0">
             <a:schemeClr val="accent1"/>
           </a:fillRef>
-          <a:effectRef idx="1">
+          <a:effectRef idx="0">
             <a:schemeClr val="accent1"/>
           </a:effectRef>
           <a:fontRef idx="minor">
-            <a:schemeClr val="dk1"/>
+            <a:schemeClr val="tx1"/>
           </a:fontRef>
         </p:style>
       </p:cxnSp>
       <p:cxnSp>
         <p:nvCxnSpPr>
-          <p:cNvPr id="72" name="Straight Connector 71">
-            <a:extLst>
-              <a:ext uri="{FF2B5EF4-FFF2-40B4-BE49-F238E27FC236}">
-                <a16:creationId xmlns:a16="http://schemas.microsoft.com/office/drawing/2014/main" id="{D7395F84-B1EB-47D3-9BCA-C74DFE2B78AD}"/>
+          <p:cNvPr id="128" name="Straight Arrow Connector 127">
+            <a:extLst>
+              <a:ext uri="{FF2B5EF4-FFF2-40B4-BE49-F238E27FC236}">
+                <a16:creationId xmlns:a16="http://schemas.microsoft.com/office/drawing/2014/main" id="{BC72D185-C39D-43C9-A3F7-73DABA7D34B7}"/>
               </a:ext>
             </a:extLst>
           </p:cNvPr>
@@ -7332,33 +7298,278 @@
           <p:nvPr/>
         </p:nvCxnSpPr>
         <p:spPr>
-          <a:xfrm flipH="1">
-            <a:off x="3145749" y="3731801"/>
-            <a:ext cx="11140" cy="1733460"/>
-          </a:xfrm>
-          <a:prstGeom prst="line">
+          <a:xfrm>
+            <a:off x="960120" y="5663097"/>
+            <a:ext cx="2130155" cy="0"/>
+          </a:xfrm>
+          <a:prstGeom prst="straightConnector1">
             <a:avLst/>
           </a:prstGeom>
           <a:ln w="19050">
             <a:solidFill>
-              <a:srgbClr val="0070C0"/>
+              <a:schemeClr val="accent1"/>
             </a:solidFill>
             <a:prstDash val="sysDash"/>
+            <a:headEnd type="arrow" w="med" len="med"/>
+            <a:tailEnd type="none" w="med" len="med"/>
           </a:ln>
-          <a:effectLst/>
         </p:spPr>
         <p:style>
           <a:lnRef idx="1">
             <a:schemeClr val="accent1"/>
           </a:lnRef>
-          <a:fillRef idx="2">
+          <a:fillRef idx="0">
             <a:schemeClr val="accent1"/>
           </a:fillRef>
-          <a:effectRef idx="1">
+          <a:effectRef idx="0">
             <a:schemeClr val="accent1"/>
           </a:effectRef>
           <a:fontRef idx="minor">
-            <a:schemeClr val="dk1"/>
+            <a:schemeClr val="tx1"/>
+          </a:fontRef>
+        </p:style>
+      </p:cxnSp>
+      <p:cxnSp>
+        <p:nvCxnSpPr>
+          <p:cNvPr id="122" name="Straight Arrow Connector 121">
+            <a:extLst>
+              <a:ext uri="{FF2B5EF4-FFF2-40B4-BE49-F238E27FC236}">
+                <a16:creationId xmlns:a16="http://schemas.microsoft.com/office/drawing/2014/main" id="{8CBC86FC-53A9-46DF-A13A-53D74E1D3DDF}"/>
+              </a:ext>
+            </a:extLst>
+          </p:cNvPr>
+          <p:cNvCxnSpPr>
+            <a:cxnSpLocks/>
+          </p:cNvCxnSpPr>
+          <p:nvPr/>
+        </p:nvCxnSpPr>
+        <p:spPr>
+          <a:xfrm>
+            <a:off x="1042416" y="1986079"/>
+            <a:ext cx="2047860" cy="0"/>
+          </a:xfrm>
+          <a:prstGeom prst="straightConnector1">
+            <a:avLst/>
+          </a:prstGeom>
+          <a:ln w="19050">
+            <a:solidFill>
+              <a:srgbClr val="00B050"/>
+            </a:solidFill>
+            <a:tailEnd type="arrow"/>
+          </a:ln>
+        </p:spPr>
+        <p:style>
+          <a:lnRef idx="1">
+            <a:schemeClr val="accent1"/>
+          </a:lnRef>
+          <a:fillRef idx="0">
+            <a:schemeClr val="accent1"/>
+          </a:fillRef>
+          <a:effectRef idx="0">
+            <a:schemeClr val="accent1"/>
+          </a:effectRef>
+          <a:fontRef idx="minor">
+            <a:schemeClr val="tx1"/>
+          </a:fontRef>
+        </p:style>
+      </p:cxnSp>
+      <p:sp>
+        <p:nvSpPr>
+          <p:cNvPr id="68" name="TextBox 67">
+            <a:extLst>
+              <a:ext uri="{FF2B5EF4-FFF2-40B4-BE49-F238E27FC236}">
+                <a16:creationId xmlns:a16="http://schemas.microsoft.com/office/drawing/2014/main" id="{D373D2D2-CE75-487B-8EE7-7A032B065A3A}"/>
+              </a:ext>
+            </a:extLst>
+          </p:cNvPr>
+          <p:cNvSpPr txBox="1"/>
+          <p:nvPr/>
+        </p:nvSpPr>
+        <p:spPr>
+          <a:xfrm>
+            <a:off x="1471229" y="1521379"/>
+            <a:ext cx="1667016" cy="430887"/>
+          </a:xfrm>
+          <a:prstGeom prst="rect">
+            <a:avLst/>
+          </a:prstGeom>
+          <a:noFill/>
+        </p:spPr>
+        <p:txBody>
+          <a:bodyPr wrap="square" lIns="0" tIns="0" rIns="0" bIns="0" rtlCol="0">
+            <a:spAutoFit/>
+          </a:bodyPr>
+          <a:lstStyle>
+            <a:defPPr>
+              <a:defRPr lang="en-US"/>
+            </a:defPPr>
+            <a:lvl1pPr algn="r">
+              <a:defRPr sz="1400">
+                <a:solidFill>
+                  <a:srgbClr val="0070C0"/>
+                </a:solidFill>
+              </a:defRPr>
+            </a:lvl1pPr>
+          </a:lstStyle>
+          <a:p>
+            <a:pPr algn="ctr"/>
+            <a:r>
+              <a:rPr lang="en-US" dirty="0"/>
+              <a:t>execute(“add y/1 s/1 c/MA1521”)</a:t>
+            </a:r>
+          </a:p>
+        </p:txBody>
+      </p:sp>
+      <p:cxnSp>
+        <p:nvCxnSpPr>
+          <p:cNvPr id="100" name="Straight Arrow Connector 99">
+            <a:extLst>
+              <a:ext uri="{FF2B5EF4-FFF2-40B4-BE49-F238E27FC236}">
+                <a16:creationId xmlns:a16="http://schemas.microsoft.com/office/drawing/2014/main" id="{C8CB02CB-7A96-4B97-B821-E1158A3C6676}"/>
+              </a:ext>
+            </a:extLst>
+          </p:cNvPr>
+          <p:cNvCxnSpPr>
+            <a:cxnSpLocks/>
+          </p:cNvCxnSpPr>
+          <p:nvPr/>
+        </p:nvCxnSpPr>
+        <p:spPr>
+          <a:xfrm flipH="1">
+            <a:off x="660761" y="6020081"/>
+            <a:ext cx="13916119" cy="33465"/>
+          </a:xfrm>
+          <a:prstGeom prst="straightConnector1">
+            <a:avLst/>
+          </a:prstGeom>
+          <a:ln w="19050">
+            <a:solidFill>
+              <a:srgbClr val="30869C"/>
+            </a:solidFill>
+            <a:tailEnd type="arrow"/>
+          </a:ln>
+        </p:spPr>
+        <p:style>
+          <a:lnRef idx="1">
+            <a:schemeClr val="accent1"/>
+          </a:lnRef>
+          <a:fillRef idx="0">
+            <a:schemeClr val="accent1"/>
+          </a:fillRef>
+          <a:effectRef idx="0">
+            <a:schemeClr val="accent1"/>
+          </a:effectRef>
+          <a:fontRef idx="minor">
+            <a:schemeClr val="tx1"/>
+          </a:fontRef>
+        </p:style>
+      </p:cxnSp>
+      <p:sp>
+        <p:nvSpPr>
+          <p:cNvPr id="111" name="TextBox 110">
+            <a:extLst>
+              <a:ext uri="{FF2B5EF4-FFF2-40B4-BE49-F238E27FC236}">
+                <a16:creationId xmlns:a16="http://schemas.microsoft.com/office/drawing/2014/main" id="{84913144-B0E7-44CC-BC92-58DA7EFF13F0}"/>
+              </a:ext>
+            </a:extLst>
+          </p:cNvPr>
+          <p:cNvSpPr txBox="1"/>
+          <p:nvPr/>
+        </p:nvSpPr>
+        <p:spPr>
+          <a:xfrm>
+            <a:off x="7003568" y="5773912"/>
+            <a:ext cx="1839009" cy="215444"/>
+          </a:xfrm>
+          <a:prstGeom prst="rect">
+            <a:avLst/>
+          </a:prstGeom>
+          <a:noFill/>
+          <a:ln>
+            <a:noFill/>
+          </a:ln>
+        </p:spPr>
+        <p:txBody>
+          <a:bodyPr wrap="square" lIns="0" tIns="0" rIns="0" bIns="0" rtlCol="0">
+            <a:spAutoFit/>
+          </a:bodyPr>
+          <a:lstStyle>
+            <a:defPPr>
+              <a:defRPr lang="en-US"/>
+            </a:defPPr>
+            <a:lvl1pPr algn="r">
+              <a:defRPr sz="1400">
+                <a:solidFill>
+                  <a:srgbClr val="0070C0"/>
+                </a:solidFill>
+              </a:defRPr>
+            </a:lvl1pPr>
+          </a:lstStyle>
+          <a:p>
+            <a:pPr algn="ctr"/>
+            <a:r>
+              <a:rPr lang="en-US" dirty="0" err="1">
+                <a:solidFill>
+                  <a:schemeClr val="accent5">
+                    <a:lumMod val="50000"/>
+                  </a:schemeClr>
+                </a:solidFill>
+              </a:rPr>
+              <a:t>handleAddEvent</a:t>
+            </a:r>
+            <a:r>
+              <a:rPr lang="en-US" dirty="0">
+                <a:solidFill>
+                  <a:schemeClr val="accent5">
+                    <a:lumMod val="50000"/>
+                  </a:schemeClr>
+                </a:solidFill>
+              </a:rPr>
+              <a:t>(event)</a:t>
+            </a:r>
+          </a:p>
+        </p:txBody>
+      </p:sp>
+      <p:cxnSp>
+        <p:nvCxnSpPr>
+          <p:cNvPr id="27" name="Straight Arrow Connector 26">
+            <a:extLst>
+              <a:ext uri="{FF2B5EF4-FFF2-40B4-BE49-F238E27FC236}">
+                <a16:creationId xmlns:a16="http://schemas.microsoft.com/office/drawing/2014/main" id="{D02F95D6-6755-4566-A302-81901BDA7CC9}"/>
+              </a:ext>
+            </a:extLst>
+          </p:cNvPr>
+          <p:cNvCxnSpPr/>
+          <p:nvPr/>
+        </p:nvCxnSpPr>
+        <p:spPr>
+          <a:xfrm>
+            <a:off x="660761" y="6549780"/>
+            <a:ext cx="13916118" cy="0"/>
+          </a:xfrm>
+          <a:prstGeom prst="straightConnector1">
+            <a:avLst/>
+          </a:prstGeom>
+          <a:ln w="28575">
+            <a:solidFill>
+              <a:schemeClr val="accent6"/>
+            </a:solidFill>
+            <a:prstDash val="sysDash"/>
+            <a:tailEnd type="triangle"/>
+          </a:ln>
+        </p:spPr>
+        <p:style>
+          <a:lnRef idx="1">
+            <a:schemeClr val="accent1"/>
+          </a:lnRef>
+          <a:fillRef idx="0">
+            <a:schemeClr val="accent1"/>
+          </a:fillRef>
+          <a:effectRef idx="0">
+            <a:schemeClr val="accent1"/>
+          </a:effectRef>
+          <a:fontRef idx="minor">
+            <a:schemeClr val="tx1"/>
           </a:fontRef>
         </p:style>
       </p:cxnSp>

</xml_diff>